<commit_message>
Arreglados detalles de la presentación
</commit_message>
<xml_diff>
--- a/JavaTracer/Analizador orientado a métodos para aplicaciones Java.pptx
+++ b/JavaTracer/Analizador orientado a métodos para aplicaciones Java.pptx
@@ -5,15 +5,15 @@
     <p:sldMasterId id="2147483780" r:id="rId1"/>
   </p:sldMasterIdLst>
   <p:notesMasterIdLst>
-    <p:notesMasterId r:id="rId22"/>
+    <p:notesMasterId r:id="rId21"/>
   </p:notesMasterIdLst>
   <p:sldIdLst>
     <p:sldId id="256" r:id="rId2"/>
     <p:sldId id="257" r:id="rId3"/>
-    <p:sldId id="258" r:id="rId4"/>
-    <p:sldId id="259" r:id="rId5"/>
-    <p:sldId id="260" r:id="rId6"/>
-    <p:sldId id="261" r:id="rId7"/>
+    <p:sldId id="259" r:id="rId4"/>
+    <p:sldId id="260" r:id="rId5"/>
+    <p:sldId id="261" r:id="rId6"/>
+    <p:sldId id="276" r:id="rId7"/>
     <p:sldId id="262" r:id="rId8"/>
     <p:sldId id="263" r:id="rId9"/>
     <p:sldId id="265" r:id="rId10"/>
@@ -25,9 +25,8 @@
     <p:sldId id="270" r:id="rId16"/>
     <p:sldId id="271" r:id="rId17"/>
     <p:sldId id="272" r:id="rId18"/>
-    <p:sldId id="273" r:id="rId19"/>
+    <p:sldId id="275" r:id="rId19"/>
     <p:sldId id="274" r:id="rId20"/>
-    <p:sldId id="275" r:id="rId21"/>
   </p:sldIdLst>
   <p:sldSz cx="9144000" cy="6858000" type="screen4x3"/>
   <p:notesSz cx="6858000" cy="9144000"/>
@@ -211,7 +210,7 @@
           <a:p>
             <a:fld id="{B592FC02-FB55-47CF-9ADD-6BDD472EB8D7}" type="datetimeFigureOut">
               <a:rPr lang="es-ES" smtClean="0"/>
-              <a:t>27/06/2014</a:t>
+              <a:t>28/06/2014</a:t>
             </a:fld>
             <a:endParaRPr lang="es-ES"/>
           </a:p>
@@ -652,7 +651,7 @@
           <a:p>
             <a:fld id="{D69C4018-7936-412E-AFA4-452A58F224F4}" type="datetimeFigureOut">
               <a:rPr lang="es-ES" smtClean="0"/>
-              <a:t>27/06/2014</a:t>
+              <a:t>28/06/2014</a:t>
             </a:fld>
             <a:endParaRPr lang="es-ES"/>
           </a:p>
@@ -817,7 +816,7 @@
           <a:p>
             <a:fld id="{D69C4018-7936-412E-AFA4-452A58F224F4}" type="datetimeFigureOut">
               <a:rPr lang="es-ES" smtClean="0"/>
-              <a:t>27/06/2014</a:t>
+              <a:t>28/06/2014</a:t>
             </a:fld>
             <a:endParaRPr lang="es-ES"/>
           </a:p>
@@ -992,7 +991,7 @@
           <a:p>
             <a:fld id="{D69C4018-7936-412E-AFA4-452A58F224F4}" type="datetimeFigureOut">
               <a:rPr lang="es-ES" smtClean="0"/>
-              <a:t>27/06/2014</a:t>
+              <a:t>28/06/2014</a:t>
             </a:fld>
             <a:endParaRPr lang="es-ES"/>
           </a:p>
@@ -1157,7 +1156,7 @@
           <a:p>
             <a:fld id="{D69C4018-7936-412E-AFA4-452A58F224F4}" type="datetimeFigureOut">
               <a:rPr lang="es-ES" smtClean="0"/>
-              <a:t>27/06/2014</a:t>
+              <a:t>28/06/2014</a:t>
             </a:fld>
             <a:endParaRPr lang="es-ES"/>
           </a:p>
@@ -1399,7 +1398,7 @@
           <a:p>
             <a:fld id="{D69C4018-7936-412E-AFA4-452A58F224F4}" type="datetimeFigureOut">
               <a:rPr lang="es-ES" smtClean="0"/>
-              <a:t>27/06/2014</a:t>
+              <a:t>28/06/2014</a:t>
             </a:fld>
             <a:endParaRPr lang="es-ES"/>
           </a:p>
@@ -1663,7 +1662,7 @@
           <a:p>
             <a:fld id="{D69C4018-7936-412E-AFA4-452A58F224F4}" type="datetimeFigureOut">
               <a:rPr lang="es-ES" smtClean="0"/>
-              <a:t>27/06/2014</a:t>
+              <a:t>28/06/2014</a:t>
             </a:fld>
             <a:endParaRPr lang="es-ES"/>
           </a:p>
@@ -2041,7 +2040,7 @@
           <a:p>
             <a:fld id="{D69C4018-7936-412E-AFA4-452A58F224F4}" type="datetimeFigureOut">
               <a:rPr lang="es-ES" smtClean="0"/>
-              <a:t>27/06/2014</a:t>
+              <a:t>28/06/2014</a:t>
             </a:fld>
             <a:endParaRPr lang="es-ES"/>
           </a:p>
@@ -2191,7 +2190,7 @@
           <a:p>
             <a:fld id="{D69C4018-7936-412E-AFA4-452A58F224F4}" type="datetimeFigureOut">
               <a:rPr lang="es-ES" smtClean="0"/>
-              <a:t>27/06/2014</a:t>
+              <a:t>28/06/2014</a:t>
             </a:fld>
             <a:endParaRPr lang="es-ES"/>
           </a:p>
@@ -2281,7 +2280,7 @@
           <a:p>
             <a:fld id="{D69C4018-7936-412E-AFA4-452A58F224F4}" type="datetimeFigureOut">
               <a:rPr lang="es-ES" smtClean="0"/>
-              <a:t>27/06/2014</a:t>
+              <a:t>28/06/2014</a:t>
             </a:fld>
             <a:endParaRPr lang="es-ES"/>
           </a:p>
@@ -2542,7 +2541,7 @@
           <a:p>
             <a:fld id="{D69C4018-7936-412E-AFA4-452A58F224F4}" type="datetimeFigureOut">
               <a:rPr lang="es-ES" smtClean="0"/>
-              <a:t>27/06/2014</a:t>
+              <a:t>28/06/2014</a:t>
             </a:fld>
             <a:endParaRPr lang="es-ES"/>
           </a:p>
@@ -2830,7 +2829,7 @@
           <a:p>
             <a:fld id="{D69C4018-7936-412E-AFA4-452A58F224F4}" type="datetimeFigureOut">
               <a:rPr lang="es-ES" smtClean="0"/>
-              <a:t>27/06/2014</a:t>
+              <a:t>28/06/2014</a:t>
             </a:fld>
             <a:endParaRPr lang="es-ES"/>
           </a:p>
@@ -3601,7 +3600,7 @@
           <a:p>
             <a:fld id="{D69C4018-7936-412E-AFA4-452A58F224F4}" type="datetimeFigureOut">
               <a:rPr lang="es-ES" smtClean="0"/>
-              <a:t>27/06/2014</a:t>
+              <a:t>28/06/2014</a:t>
             </a:fld>
             <a:endParaRPr lang="es-ES"/>
           </a:p>
@@ -4859,18 +4858,18 @@
         <p:spPr>
           <a:xfrm>
             <a:off x="467544" y="980728"/>
-            <a:ext cx="8229600" cy="1143000"/>
+            <a:ext cx="8229600" cy="864096"/>
           </a:xfrm>
         </p:spPr>
         <p:txBody>
           <a:bodyPr>
-            <a:normAutofit fontScale="90000"/>
+            <a:normAutofit/>
           </a:bodyPr>
           <a:lstStyle/>
           <a:p>
             <a:r>
               <a:rPr lang="es-ES" dirty="0" smtClean="0"/>
-              <a:t>Desarrollo y problemas encontrados</a:t>
+              <a:t>Desarrollo del proyecto</a:t>
             </a:r>
             <a:endParaRPr lang="es-ES" dirty="0"/>
           </a:p>
@@ -4898,7 +4897,7 @@
           <a:p>
             <a:r>
               <a:rPr lang="es-ES" dirty="0" smtClean="0"/>
-              <a:t>Durante el desarrollo surgieron diversos problemas.</a:t>
+              <a:t>Durante el desarrollo surgieron diversos problemas:</a:t>
             </a:r>
           </a:p>
           <a:p>
@@ -4914,35 +4913,6 @@
               <a:rPr lang="es-ES" dirty="0" smtClean="0"/>
               <a:t>Gestión E/S del programa.</a:t>
             </a:r>
-          </a:p>
-          <a:p>
-            <a:r>
-              <a:rPr lang="es-ES" dirty="0"/>
-              <a:t>La aplicación tiene ciertas limitaciones</a:t>
-            </a:r>
-            <a:r>
-              <a:rPr lang="es-ES" dirty="0" smtClean="0"/>
-              <a:t>.</a:t>
-            </a:r>
-          </a:p>
-          <a:p>
-            <a:pPr lvl="1"/>
-            <a:r>
-              <a:rPr lang="es-ES" dirty="0" smtClean="0"/>
-              <a:t>Tamaño de la traza y almacenamiento.</a:t>
-            </a:r>
-          </a:p>
-          <a:p>
-            <a:pPr lvl="1"/>
-            <a:r>
-              <a:rPr lang="es-ES" dirty="0" smtClean="0"/>
-              <a:t>Navegación en el árbol.</a:t>
-            </a:r>
-            <a:endParaRPr lang="es-ES" dirty="0"/>
-          </a:p>
-          <a:p>
-            <a:pPr lvl="1"/>
-            <a:endParaRPr lang="es-ES" dirty="0" smtClean="0"/>
           </a:p>
           <a:p>
             <a:endParaRPr lang="es-ES" dirty="0"/>
@@ -5114,153 +5084,6 @@
                       </p:childTnLst>
                     </p:cTn>
                   </p:par>
-                  <p:par>
-                    <p:cTn id="15" fill="hold">
-                      <p:stCondLst>
-                        <p:cond delay="indefinite"/>
-                      </p:stCondLst>
-                      <p:childTnLst>
-                        <p:par>
-                          <p:cTn id="16" fill="hold">
-                            <p:stCondLst>
-                              <p:cond delay="0"/>
-                            </p:stCondLst>
-                            <p:childTnLst>
-                              <p:par>
-                                <p:cTn id="17" presetID="1" presetClass="entr" presetSubtype="0" fill="hold" grpId="0" nodeType="clickEffect">
-                                  <p:stCondLst>
-                                    <p:cond delay="0"/>
-                                  </p:stCondLst>
-                                  <p:childTnLst>
-                                    <p:set>
-                                      <p:cBhvr>
-                                        <p:cTn id="18" dur="1" fill="hold">
-                                          <p:stCondLst>
-                                            <p:cond delay="0"/>
-                                          </p:stCondLst>
-                                        </p:cTn>
-                                        <p:tgtEl>
-                                          <p:spTgt spid="3">
-                                            <p:txEl>
-                                              <p:pRg st="3" end="3"/>
-                                            </p:txEl>
-                                          </p:spTgt>
-                                        </p:tgtEl>
-                                        <p:attrNameLst>
-                                          <p:attrName>style.visibility</p:attrName>
-                                        </p:attrNameLst>
-                                      </p:cBhvr>
-                                      <p:to>
-                                        <p:strVal val="visible"/>
-                                      </p:to>
-                                    </p:set>
-                                  </p:childTnLst>
-                                </p:cTn>
-                              </p:par>
-                            </p:childTnLst>
-                          </p:cTn>
-                        </p:par>
-                      </p:childTnLst>
-                    </p:cTn>
-                  </p:par>
-                  <p:par>
-                    <p:cTn id="19" fill="hold">
-                      <p:stCondLst>
-                        <p:cond delay="indefinite"/>
-                      </p:stCondLst>
-                      <p:childTnLst>
-                        <p:par>
-                          <p:cTn id="20" fill="hold">
-                            <p:stCondLst>
-                              <p:cond delay="0"/>
-                            </p:stCondLst>
-                            <p:childTnLst>
-                              <p:par>
-                                <p:cTn id="21" presetID="1" presetClass="entr" presetSubtype="0" fill="hold" grpId="0" nodeType="clickEffect">
-                                  <p:stCondLst>
-                                    <p:cond delay="0"/>
-                                  </p:stCondLst>
-                                  <p:childTnLst>
-                                    <p:set>
-                                      <p:cBhvr>
-                                        <p:cTn id="22" dur="1" fill="hold">
-                                          <p:stCondLst>
-                                            <p:cond delay="0"/>
-                                          </p:stCondLst>
-                                        </p:cTn>
-                                        <p:tgtEl>
-                                          <p:spTgt spid="3">
-                                            <p:txEl>
-                                              <p:pRg st="4" end="4"/>
-                                            </p:txEl>
-                                          </p:spTgt>
-                                        </p:tgtEl>
-                                        <p:attrNameLst>
-                                          <p:attrName>style.visibility</p:attrName>
-                                        </p:attrNameLst>
-                                      </p:cBhvr>
-                                      <p:to>
-                                        <p:strVal val="visible"/>
-                                      </p:to>
-                                    </p:set>
-                                  </p:childTnLst>
-                                </p:cTn>
-                              </p:par>
-                            </p:childTnLst>
-                          </p:cTn>
-                        </p:par>
-                      </p:childTnLst>
-                    </p:cTn>
-                  </p:par>
-                  <p:par>
-                    <p:cTn id="23" fill="hold">
-                      <p:stCondLst>
-                        <p:cond delay="indefinite"/>
-                      </p:stCondLst>
-                      <p:childTnLst>
-                        <p:par>
-                          <p:cTn id="24" fill="hold">
-                            <p:stCondLst>
-                              <p:cond delay="0"/>
-                            </p:stCondLst>
-                            <p:childTnLst>
-                              <p:par>
-                                <p:cTn id="25" presetID="1" presetClass="entr" presetSubtype="0" fill="hold" grpId="0" nodeType="clickEffect">
-                                  <p:stCondLst>
-                                    <p:cond delay="0"/>
-                                  </p:stCondLst>
-                                  <p:childTnLst>
-                                    <p:set>
-                                      <p:cBhvr>
-                                        <p:cTn id="26" dur="1" fill="hold">
-                                          <p:stCondLst>
-                                            <p:cond delay="0"/>
-                                          </p:stCondLst>
-                                        </p:cTn>
-                                        <p:tgtEl>
-                                          <p:spTgt spid="3">
-                                            <p:txEl>
-                                              <p:pRg st="5" end="5"/>
-                                            </p:txEl>
-                                          </p:spTgt>
-                                        </p:tgtEl>
-                                        <p:attrNameLst>
-                                          <p:attrName>style.visibility</p:attrName>
-                                        </p:attrNameLst>
-                                      </p:cBhvr>
-                                      <p:to>
-                                        <p:strVal val="visible"/>
-                                      </p:to>
-                                    </p:set>
-                                  </p:childTnLst>
-                                </p:cTn>
-                              </p:par>
-                            </p:childTnLst>
-                          </p:cTn>
-                        </p:par>
-                      </p:childTnLst>
-                    </p:cTn>
-                  </p:par>
                 </p:childTnLst>
               </p:cTn>
               <p:prevCondLst>
@@ -5342,7 +5165,7 @@
         <p:spPr/>
         <p:txBody>
           <a:bodyPr>
-            <a:normAutofit lnSpcReduction="10000"/>
+            <a:normAutofit/>
           </a:bodyPr>
           <a:lstStyle/>
           <a:p>
@@ -5356,19 +5179,25 @@
             </a:r>
             <a:r>
               <a:rPr lang="es-ES" dirty="0" smtClean="0"/>
-              <a:t>amaño de la traza depende del tamaño de los objetos y el número de llamadas a los métodos.</a:t>
-            </a:r>
-          </a:p>
-          <a:p>
+              <a:t>amaño de la traza depende del tamaño de los objetos y el número de llamadas a los </a:t>
+            </a:r>
             <a:r>
               <a:rPr lang="es-ES" dirty="0" smtClean="0"/>
-              <a:t>En programas de grandes tamaños, el tamaño de la traza puede llegar a ser excesivo.</a:t>
-            </a:r>
-          </a:p>
-          <a:p>
+              <a:t>métodos </a:t>
+            </a:r>
+            <a:r>
+              <a:rPr lang="es-ES" dirty="0" smtClean="0">
+                <a:sym typeface="Wingdings" panose="05000000000000000000" pitchFamily="2" charset="2"/>
+              </a:rPr>
+              <a:t> puede</a:t>
+            </a:r>
             <a:r>
               <a:rPr lang="es-ES" dirty="0" smtClean="0"/>
-              <a:t>Dicho exceso puede llegar a ser un gran problema.</a:t>
+              <a:t> </a:t>
+            </a:r>
+            <a:r>
+              <a:rPr lang="es-ES" dirty="0" smtClean="0"/>
+              <a:t>llegar a ser excesivo.</a:t>
             </a:r>
           </a:p>
           <a:p>
@@ -5392,22 +5221,7 @@
             <a:pPr lvl="1"/>
             <a:r>
               <a:rPr lang="es-ES" dirty="0" smtClean="0"/>
-              <a:t>Exclusión de librerías externas.</a:t>
-            </a:r>
-          </a:p>
-          <a:p>
-            <a:pPr lvl="1"/>
-            <a:r>
-              <a:rPr lang="es-ES" dirty="0" smtClean="0"/>
-              <a:t>Exclusión del objeto </a:t>
-            </a:r>
-            <a:r>
-              <a:rPr lang="es-ES" i="1" u="sng" dirty="0" smtClean="0"/>
-              <a:t>this</a:t>
-            </a:r>
-            <a:r>
-              <a:rPr lang="es-ES" dirty="0" smtClean="0"/>
-              <a:t>.</a:t>
+              <a:t>Exclusión de bibliotecas  externas.</a:t>
             </a:r>
           </a:p>
         </p:txBody>
@@ -5507,7 +5321,7 @@
                                         <p:tgtEl>
                                           <p:spTgt spid="3">
                                             <p:txEl>
-                                              <p:pRg st="1" end="1"/>
+                                              <p:pRg st="2" end="2"/>
                                             </p:txEl>
                                           </p:spTgt>
                                         </p:tgtEl>
@@ -5556,7 +5370,7 @@
                                         <p:tgtEl>
                                           <p:spTgt spid="3">
                                             <p:txEl>
-                                              <p:pRg st="2" end="2"/>
+                                              <p:pRg st="3" end="3"/>
                                             </p:txEl>
                                           </p:spTgt>
                                         </p:tgtEl>
@@ -5626,153 +5440,6 @@
                       </p:childTnLst>
                     </p:cTn>
                   </p:par>
-                  <p:par>
-                    <p:cTn id="19" fill="hold">
-                      <p:stCondLst>
-                        <p:cond delay="indefinite"/>
-                      </p:stCondLst>
-                      <p:childTnLst>
-                        <p:par>
-                          <p:cTn id="20" fill="hold">
-                            <p:stCondLst>
-                              <p:cond delay="0"/>
-                            </p:stCondLst>
-                            <p:childTnLst>
-                              <p:par>
-                                <p:cTn id="21" presetID="1" presetClass="entr" presetSubtype="0" fill="hold" grpId="0" nodeType="clickEffect">
-                                  <p:stCondLst>
-                                    <p:cond delay="0"/>
-                                  </p:stCondLst>
-                                  <p:childTnLst>
-                                    <p:set>
-                                      <p:cBhvr>
-                                        <p:cTn id="22" dur="1" fill="hold">
-                                          <p:stCondLst>
-                                            <p:cond delay="0"/>
-                                          </p:stCondLst>
-                                        </p:cTn>
-                                        <p:tgtEl>
-                                          <p:spTgt spid="3">
-                                            <p:txEl>
-                                              <p:pRg st="5" end="5"/>
-                                            </p:txEl>
-                                          </p:spTgt>
-                                        </p:tgtEl>
-                                        <p:attrNameLst>
-                                          <p:attrName>style.visibility</p:attrName>
-                                        </p:attrNameLst>
-                                      </p:cBhvr>
-                                      <p:to>
-                                        <p:strVal val="visible"/>
-                                      </p:to>
-                                    </p:set>
-                                  </p:childTnLst>
-                                </p:cTn>
-                              </p:par>
-                            </p:childTnLst>
-                          </p:cTn>
-                        </p:par>
-                      </p:childTnLst>
-                    </p:cTn>
-                  </p:par>
-                  <p:par>
-                    <p:cTn id="23" fill="hold">
-                      <p:stCondLst>
-                        <p:cond delay="indefinite"/>
-                      </p:stCondLst>
-                      <p:childTnLst>
-                        <p:par>
-                          <p:cTn id="24" fill="hold">
-                            <p:stCondLst>
-                              <p:cond delay="0"/>
-                            </p:stCondLst>
-                            <p:childTnLst>
-                              <p:par>
-                                <p:cTn id="25" presetID="1" presetClass="entr" presetSubtype="0" fill="hold" grpId="0" nodeType="clickEffect">
-                                  <p:stCondLst>
-                                    <p:cond delay="0"/>
-                                  </p:stCondLst>
-                                  <p:childTnLst>
-                                    <p:set>
-                                      <p:cBhvr>
-                                        <p:cTn id="26" dur="1" fill="hold">
-                                          <p:stCondLst>
-                                            <p:cond delay="0"/>
-                                          </p:stCondLst>
-                                        </p:cTn>
-                                        <p:tgtEl>
-                                          <p:spTgt spid="3">
-                                            <p:txEl>
-                                              <p:pRg st="6" end="6"/>
-                                            </p:txEl>
-                                          </p:spTgt>
-                                        </p:tgtEl>
-                                        <p:attrNameLst>
-                                          <p:attrName>style.visibility</p:attrName>
-                                        </p:attrNameLst>
-                                      </p:cBhvr>
-                                      <p:to>
-                                        <p:strVal val="visible"/>
-                                      </p:to>
-                                    </p:set>
-                                  </p:childTnLst>
-                                </p:cTn>
-                              </p:par>
-                            </p:childTnLst>
-                          </p:cTn>
-                        </p:par>
-                      </p:childTnLst>
-                    </p:cTn>
-                  </p:par>
-                  <p:par>
-                    <p:cTn id="27" fill="hold">
-                      <p:stCondLst>
-                        <p:cond delay="indefinite"/>
-                      </p:stCondLst>
-                      <p:childTnLst>
-                        <p:par>
-                          <p:cTn id="28" fill="hold">
-                            <p:stCondLst>
-                              <p:cond delay="0"/>
-                            </p:stCondLst>
-                            <p:childTnLst>
-                              <p:par>
-                                <p:cTn id="29" presetID="1" presetClass="entr" presetSubtype="0" fill="hold" grpId="0" nodeType="clickEffect">
-                                  <p:stCondLst>
-                                    <p:cond delay="0"/>
-                                  </p:stCondLst>
-                                  <p:childTnLst>
-                                    <p:set>
-                                      <p:cBhvr>
-                                        <p:cTn id="30" dur="1" fill="hold">
-                                          <p:stCondLst>
-                                            <p:cond delay="0"/>
-                                          </p:stCondLst>
-                                        </p:cTn>
-                                        <p:tgtEl>
-                                          <p:spTgt spid="3">
-                                            <p:txEl>
-                                              <p:pRg st="7" end="7"/>
-                                            </p:txEl>
-                                          </p:spTgt>
-                                        </p:tgtEl>
-                                        <p:attrNameLst>
-                                          <p:attrName>style.visibility</p:attrName>
-                                        </p:attrNameLst>
-                                      </p:cBhvr>
-                                      <p:to>
-                                        <p:strVal val="visible"/>
-                                      </p:to>
-                                    </p:set>
-                                  </p:childTnLst>
-                                </p:cTn>
-                              </p:par>
-                            </p:childTnLst>
-                          </p:cTn>
-                        </p:par>
-                      </p:childTnLst>
-                    </p:cTn>
-                  </p:par>
                 </p:childTnLst>
               </p:cTn>
               <p:prevCondLst>
@@ -5893,15 +5560,7 @@
             <a:pPr lvl="1"/>
             <a:r>
               <a:rPr lang="es-ES" dirty="0" smtClean="0"/>
-              <a:t>Implementación  </a:t>
-            </a:r>
-            <a:r>
-              <a:rPr lang="es-ES" u="sng" dirty="0" smtClean="0"/>
-              <a:t>de</a:t>
-            </a:r>
-            <a:r>
-              <a:rPr lang="es-ES" dirty="0" smtClean="0"/>
-              <a:t> una consola.</a:t>
+              <a:t>Implementación  de una consola.</a:t>
             </a:r>
             <a:endParaRPr lang="es-ES" dirty="0"/>
           </a:p>
@@ -6265,14 +5924,18 @@
         </p:spPr>
         <p:txBody>
           <a:bodyPr>
-            <a:normAutofit fontScale="90000"/>
+            <a:normAutofit/>
           </a:bodyPr>
           <a:lstStyle/>
           <a:p>
             <a:pPr algn="ctr"/>
             <a:r>
               <a:rPr lang="es-ES" dirty="0" smtClean="0"/>
-              <a:t>Limitaciones - Tamaño de la traza</a:t>
+              <a:t>Trabajo </a:t>
+            </a:r>
+            <a:r>
+              <a:rPr lang="es-ES" dirty="0" smtClean="0"/>
+              <a:t>futuro</a:t>
             </a:r>
             <a:endParaRPr lang="es-ES" dirty="0"/>
           </a:p>
@@ -6288,24 +5951,21 @@
             <p:ph idx="1"/>
           </p:nvPr>
         </p:nvSpPr>
-        <p:spPr/>
+        <p:spPr>
+          <a:xfrm>
+            <a:off x="395536" y="1844824"/>
+            <a:ext cx="8229600" cy="3888432"/>
+          </a:xfrm>
+        </p:spPr>
         <p:txBody>
           <a:bodyPr/>
           <a:lstStyle/>
           <a:p>
             <a:r>
               <a:rPr lang="es-ES" dirty="0" smtClean="0"/>
-              <a:t>Mediante las soluciones propuestas no se llega a solucionar dicha limitación.</a:t>
-            </a:r>
-          </a:p>
-          <a:p>
-            <a:endParaRPr lang="es-ES" dirty="0"/>
-          </a:p>
-          <a:p>
-            <a:r>
-              <a:rPr lang="es-ES" dirty="0" smtClean="0"/>
-              <a:t>Soluciones:</a:t>
-            </a:r>
+              <a:t>Traza:</a:t>
+            </a:r>
+            <a:endParaRPr lang="es-ES" dirty="0" smtClean="0"/>
           </a:p>
           <a:p>
             <a:pPr lvl="1"/>
@@ -6320,6 +5980,29 @@
               <a:rPr lang="es-ES" dirty="0" smtClean="0"/>
               <a:t>Para programas excesivamente grande se podría utilizar BigData como método de almacenamiento. </a:t>
             </a:r>
+            <a:endParaRPr lang="es-ES" dirty="0" smtClean="0"/>
+          </a:p>
+          <a:p>
+            <a:r>
+              <a:rPr lang="es-ES" dirty="0" smtClean="0"/>
+              <a:t>Navegación:</a:t>
+            </a:r>
+          </a:p>
+          <a:p>
+            <a:pPr lvl="1"/>
+            <a:r>
+              <a:rPr lang="es-ES" dirty="0"/>
+              <a:t>Búsqueda de nodos a través de una consulta.</a:t>
+            </a:r>
+          </a:p>
+          <a:p>
+            <a:pPr lvl="1"/>
+            <a:r>
+              <a:rPr lang="es-ES" dirty="0"/>
+              <a:t>Realizar podas en el árbol.</a:t>
+            </a:r>
+          </a:p>
+          <a:p>
             <a:endParaRPr lang="es-ES" dirty="0"/>
           </a:p>
         </p:txBody>
@@ -6419,7 +6102,7 @@
                                         <p:tgtEl>
                                           <p:spTgt spid="3">
                                             <p:txEl>
-                                              <p:pRg st="2" end="2"/>
+                                              <p:pRg st="1" end="1"/>
                                             </p:txEl>
                                           </p:spTgt>
                                         </p:tgtEl>
@@ -6468,7 +6151,7 @@
                                         <p:tgtEl>
                                           <p:spTgt spid="3">
                                             <p:txEl>
-                                              <p:pRg st="3" end="3"/>
+                                              <p:pRg st="2" end="2"/>
                                             </p:txEl>
                                           </p:spTgt>
                                         </p:tgtEl>
@@ -6517,7 +6200,69 @@
                                         <p:tgtEl>
                                           <p:spTgt spid="3">
                                             <p:txEl>
+                                              <p:pRg st="3" end="3"/>
+                                            </p:txEl>
+                                          </p:spTgt>
+                                        </p:tgtEl>
+                                        <p:attrNameLst>
+                                          <p:attrName>style.visibility</p:attrName>
+                                        </p:attrNameLst>
+                                      </p:cBhvr>
+                                      <p:to>
+                                        <p:strVal val="visible"/>
+                                      </p:to>
+                                    </p:set>
+                                  </p:childTnLst>
+                                </p:cTn>
+                              </p:par>
+                              <p:par>
+                                <p:cTn id="19" presetID="1" presetClass="entr" presetSubtype="0" fill="hold" grpId="0" nodeType="withEffect">
+                                  <p:stCondLst>
+                                    <p:cond delay="0"/>
+                                  </p:stCondLst>
+                                  <p:childTnLst>
+                                    <p:set>
+                                      <p:cBhvr>
+                                        <p:cTn id="20" dur="1" fill="hold">
+                                          <p:stCondLst>
+                                            <p:cond delay="0"/>
+                                          </p:stCondLst>
+                                        </p:cTn>
+                                        <p:tgtEl>
+                                          <p:spTgt spid="3">
+                                            <p:txEl>
                                               <p:pRg st="4" end="4"/>
+                                            </p:txEl>
+                                          </p:spTgt>
+                                        </p:tgtEl>
+                                        <p:attrNameLst>
+                                          <p:attrName>style.visibility</p:attrName>
+                                        </p:attrNameLst>
+                                      </p:cBhvr>
+                                      <p:to>
+                                        <p:strVal val="visible"/>
+                                      </p:to>
+                                    </p:set>
+                                  </p:childTnLst>
+                                </p:cTn>
+                              </p:par>
+                              <p:par>
+                                <p:cTn id="21" presetID="1" presetClass="entr" presetSubtype="0" fill="hold" grpId="0" nodeType="withEffect">
+                                  <p:stCondLst>
+                                    <p:cond delay="0"/>
+                                  </p:stCondLst>
+                                  <p:childTnLst>
+                                    <p:set>
+                                      <p:cBhvr>
+                                        <p:cTn id="22" dur="1" fill="hold">
+                                          <p:stCondLst>
+                                            <p:cond delay="0"/>
+                                          </p:stCondLst>
+                                        </p:cTn>
+                                        <p:tgtEl>
+                                          <p:spTgt spid="3">
+                                            <p:txEl>
+                                              <p:pRg st="5" end="5"/>
                                             </p:txEl>
                                           </p:spTgt>
                                         </p:tgtEl>
@@ -6596,7 +6341,7 @@
         <p:spPr>
           <a:xfrm>
             <a:off x="457200" y="704088"/>
-            <a:ext cx="8229600" cy="996720"/>
+            <a:ext cx="8229600" cy="1500776"/>
           </a:xfrm>
         </p:spPr>
         <p:txBody>
@@ -6606,62 +6351,59 @@
             <a:pPr algn="ctr"/>
             <a:r>
               <a:rPr lang="es-ES" dirty="0" smtClean="0"/>
-              <a:t>Limitaciones - Navegación</a:t>
+              <a:t>Muchas gracias por su atención</a:t>
             </a:r>
             <a:endParaRPr lang="es-ES" dirty="0"/>
           </a:p>
         </p:txBody>
       </p:sp>
-      <p:sp>
-        <p:nvSpPr>
-          <p:cNvPr id="3" name="2 Marcador de contenido"/>
-          <p:cNvSpPr>
-            <a:spLocks noGrp="1"/>
-          </p:cNvSpPr>
+      <p:pic>
+        <p:nvPicPr>
+          <p:cNvPr id="6" name="Picture 2" descr="C:\Users\Saskya\Desktop\tecla_fin.jpg"/>
+          <p:cNvPicPr>
+            <a:picLocks noGrp="1" noChangeAspect="1" noChangeArrowheads="1"/>
+          </p:cNvPicPr>
           <p:nvPr>
             <p:ph idx="1"/>
           </p:nvPr>
-        </p:nvSpPr>
-        <p:spPr/>
-        <p:txBody>
-          <a:bodyPr/>
-          <a:lstStyle/>
-          <a:p>
-            <a:r>
-              <a:rPr lang="es-ES" dirty="0" smtClean="0"/>
-              <a:t>Puede ser demasiado laborioso buscar información dentro del árbol.</a:t>
-            </a:r>
-          </a:p>
-          <a:p>
-            <a:endParaRPr lang="es-ES" dirty="0"/>
-          </a:p>
-          <a:p>
-            <a:r>
-              <a:rPr lang="es-ES" dirty="0" smtClean="0"/>
-              <a:t>Soluciones:</a:t>
-            </a:r>
-          </a:p>
-          <a:p>
-            <a:pPr lvl="1"/>
-            <a:r>
-              <a:rPr lang="es-ES" dirty="0" smtClean="0"/>
-              <a:t>Búsqueda de nodos a través de una consulta.</a:t>
-            </a:r>
-          </a:p>
-          <a:p>
-            <a:pPr lvl="1"/>
-            <a:r>
-              <a:rPr lang="es-ES" dirty="0" smtClean="0"/>
-              <a:t>Realizar podas en el árbol.</a:t>
-            </a:r>
-            <a:endParaRPr lang="es-ES" dirty="0"/>
-          </a:p>
-        </p:txBody>
-      </p:sp>
+        </p:nvPicPr>
+        <p:blipFill>
+          <a:blip r:embed="rId2">
+            <a:extLst>
+              <a:ext uri="{28A0092B-C50C-407E-A947-70E740481C1C}">
+                <a14:useLocalDpi xmlns:a14="http://schemas.microsoft.com/office/drawing/2010/main" val="0"/>
+              </a:ext>
+            </a:extLst>
+          </a:blip>
+          <a:srcRect/>
+          <a:stretch>
+            <a:fillRect/>
+          </a:stretch>
+        </p:blipFill>
+        <p:spPr bwMode="auto">
+          <a:xfrm>
+            <a:off x="2123728" y="2564904"/>
+            <a:ext cx="4752528" cy="3813903"/>
+          </a:xfrm>
+          <a:prstGeom prst="rect">
+            <a:avLst/>
+          </a:prstGeom>
+          <a:noFill/>
+          <a:extLst>
+            <a:ext uri="{909E8E84-426E-40DD-AFC4-6F175D3DCCD1}">
+              <a14:hiddenFill xmlns:a14="http://schemas.microsoft.com/office/drawing/2010/main">
+                <a:solidFill>
+                  <a:srgbClr val="FFFFFF"/>
+                </a:solidFill>
+              </a14:hiddenFill>
+            </a:ext>
+          </a:extLst>
+        </p:spPr>
+      </p:pic>
     </p:spTree>
     <p:extLst>
       <p:ext uri="{BB962C8B-B14F-4D97-AF65-F5344CB8AC3E}">
-        <p14:creationId xmlns:p14="http://schemas.microsoft.com/office/powerpoint/2010/main" val="1391060829"/>
+        <p14:creationId xmlns:p14="http://schemas.microsoft.com/office/powerpoint/2010/main" val="2318250775"/>
       </p:ext>
     </p:extLst>
   </p:cSld>
@@ -6671,231 +6413,9 @@
   <p:timing>
     <p:tnLst>
       <p:par>
-        <p:cTn id="1" dur="indefinite" restart="never" nodeType="tmRoot">
-          <p:childTnLst>
-            <p:seq concurrent="1" nextAc="seek">
-              <p:cTn id="2" dur="indefinite" nodeType="mainSeq">
-                <p:childTnLst>
-                  <p:par>
-                    <p:cTn id="3" fill="hold">
-                      <p:stCondLst>
-                        <p:cond delay="indefinite"/>
-                      </p:stCondLst>
-                      <p:childTnLst>
-                        <p:par>
-                          <p:cTn id="4" fill="hold">
-                            <p:stCondLst>
-                              <p:cond delay="0"/>
-                            </p:stCondLst>
-                            <p:childTnLst>
-                              <p:par>
-                                <p:cTn id="5" presetID="1" presetClass="entr" presetSubtype="0" fill="hold" grpId="0" nodeType="clickEffect">
-                                  <p:stCondLst>
-                                    <p:cond delay="0"/>
-                                  </p:stCondLst>
-                                  <p:childTnLst>
-                                    <p:set>
-                                      <p:cBhvr>
-                                        <p:cTn id="6" dur="1" fill="hold">
-                                          <p:stCondLst>
-                                            <p:cond delay="0"/>
-                                          </p:stCondLst>
-                                        </p:cTn>
-                                        <p:tgtEl>
-                                          <p:spTgt spid="3">
-                                            <p:txEl>
-                                              <p:pRg st="0" end="0"/>
-                                            </p:txEl>
-                                          </p:spTgt>
-                                        </p:tgtEl>
-                                        <p:attrNameLst>
-                                          <p:attrName>style.visibility</p:attrName>
-                                        </p:attrNameLst>
-                                      </p:cBhvr>
-                                      <p:to>
-                                        <p:strVal val="visible"/>
-                                      </p:to>
-                                    </p:set>
-                                  </p:childTnLst>
-                                </p:cTn>
-                              </p:par>
-                            </p:childTnLst>
-                          </p:cTn>
-                        </p:par>
-                      </p:childTnLst>
-                    </p:cTn>
-                  </p:par>
-                  <p:par>
-                    <p:cTn id="7" fill="hold">
-                      <p:stCondLst>
-                        <p:cond delay="indefinite"/>
-                      </p:stCondLst>
-                      <p:childTnLst>
-                        <p:par>
-                          <p:cTn id="8" fill="hold">
-                            <p:stCondLst>
-                              <p:cond delay="0"/>
-                            </p:stCondLst>
-                            <p:childTnLst>
-                              <p:par>
-                                <p:cTn id="9" presetID="1" presetClass="entr" presetSubtype="0" fill="hold" grpId="0" nodeType="clickEffect">
-                                  <p:stCondLst>
-                                    <p:cond delay="0"/>
-                                  </p:stCondLst>
-                                  <p:childTnLst>
-                                    <p:set>
-                                      <p:cBhvr>
-                                        <p:cTn id="10" dur="1" fill="hold">
-                                          <p:stCondLst>
-                                            <p:cond delay="0"/>
-                                          </p:stCondLst>
-                                        </p:cTn>
-                                        <p:tgtEl>
-                                          <p:spTgt spid="3">
-                                            <p:txEl>
-                                              <p:pRg st="2" end="2"/>
-                                            </p:txEl>
-                                          </p:spTgt>
-                                        </p:tgtEl>
-                                        <p:attrNameLst>
-                                          <p:attrName>style.visibility</p:attrName>
-                                        </p:attrNameLst>
-                                      </p:cBhvr>
-                                      <p:to>
-                                        <p:strVal val="visible"/>
-                                      </p:to>
-                                    </p:set>
-                                  </p:childTnLst>
-                                </p:cTn>
-                              </p:par>
-                            </p:childTnLst>
-                          </p:cTn>
-                        </p:par>
-                      </p:childTnLst>
-                    </p:cTn>
-                  </p:par>
-                  <p:par>
-                    <p:cTn id="11" fill="hold">
-                      <p:stCondLst>
-                        <p:cond delay="indefinite"/>
-                      </p:stCondLst>
-                      <p:childTnLst>
-                        <p:par>
-                          <p:cTn id="12" fill="hold">
-                            <p:stCondLst>
-                              <p:cond delay="0"/>
-                            </p:stCondLst>
-                            <p:childTnLst>
-                              <p:par>
-                                <p:cTn id="13" presetID="1" presetClass="entr" presetSubtype="0" fill="hold" grpId="0" nodeType="clickEffect">
-                                  <p:stCondLst>
-                                    <p:cond delay="0"/>
-                                  </p:stCondLst>
-                                  <p:childTnLst>
-                                    <p:set>
-                                      <p:cBhvr>
-                                        <p:cTn id="14" dur="1" fill="hold">
-                                          <p:stCondLst>
-                                            <p:cond delay="0"/>
-                                          </p:stCondLst>
-                                        </p:cTn>
-                                        <p:tgtEl>
-                                          <p:spTgt spid="3">
-                                            <p:txEl>
-                                              <p:pRg st="3" end="3"/>
-                                            </p:txEl>
-                                          </p:spTgt>
-                                        </p:tgtEl>
-                                        <p:attrNameLst>
-                                          <p:attrName>style.visibility</p:attrName>
-                                        </p:attrNameLst>
-                                      </p:cBhvr>
-                                      <p:to>
-                                        <p:strVal val="visible"/>
-                                      </p:to>
-                                    </p:set>
-                                  </p:childTnLst>
-                                </p:cTn>
-                              </p:par>
-                            </p:childTnLst>
-                          </p:cTn>
-                        </p:par>
-                      </p:childTnLst>
-                    </p:cTn>
-                  </p:par>
-                  <p:par>
-                    <p:cTn id="15" fill="hold">
-                      <p:stCondLst>
-                        <p:cond delay="indefinite"/>
-                      </p:stCondLst>
-                      <p:childTnLst>
-                        <p:par>
-                          <p:cTn id="16" fill="hold">
-                            <p:stCondLst>
-                              <p:cond delay="0"/>
-                            </p:stCondLst>
-                            <p:childTnLst>
-                              <p:par>
-                                <p:cTn id="17" presetID="1" presetClass="entr" presetSubtype="0" fill="hold" grpId="0" nodeType="clickEffect">
-                                  <p:stCondLst>
-                                    <p:cond delay="0"/>
-                                  </p:stCondLst>
-                                  <p:childTnLst>
-                                    <p:set>
-                                      <p:cBhvr>
-                                        <p:cTn id="18" dur="1" fill="hold">
-                                          <p:stCondLst>
-                                            <p:cond delay="0"/>
-                                          </p:stCondLst>
-                                        </p:cTn>
-                                        <p:tgtEl>
-                                          <p:spTgt spid="3">
-                                            <p:txEl>
-                                              <p:pRg st="4" end="4"/>
-                                            </p:txEl>
-                                          </p:spTgt>
-                                        </p:tgtEl>
-                                        <p:attrNameLst>
-                                          <p:attrName>style.visibility</p:attrName>
-                                        </p:attrNameLst>
-                                      </p:cBhvr>
-                                      <p:to>
-                                        <p:strVal val="visible"/>
-                                      </p:to>
-                                    </p:set>
-                                  </p:childTnLst>
-                                </p:cTn>
-                              </p:par>
-                            </p:childTnLst>
-                          </p:cTn>
-                        </p:par>
-                      </p:childTnLst>
-                    </p:cTn>
-                  </p:par>
-                </p:childTnLst>
-              </p:cTn>
-              <p:prevCondLst>
-                <p:cond evt="onPrev" delay="0">
-                  <p:tgtEl>
-                    <p:sldTgt/>
-                  </p:tgtEl>
-                </p:cond>
-              </p:prevCondLst>
-              <p:nextCondLst>
-                <p:cond evt="onNext" delay="0">
-                  <p:tgtEl>
-                    <p:sldTgt/>
-                  </p:tgtEl>
-                </p:cond>
-              </p:nextCondLst>
-            </p:seq>
-          </p:childTnLst>
-        </p:cTn>
+        <p:cTn id="1" dur="indefinite" restart="never" nodeType="tmRoot"/>
       </p:par>
     </p:tnLst>
-    <p:bldLst>
-      <p:bldP spid="3" grpId="0" uiExpand="1" build="p"/>
-    </p:bldLst>
   </p:timing>
 </p:sld>
 </file>
@@ -7062,7 +6582,7 @@
         <p:spPr>
           <a:xfrm>
             <a:off x="457200" y="2276872"/>
-            <a:ext cx="8229600" cy="4047728"/>
+            <a:ext cx="8229600" cy="2880320"/>
           </a:xfrm>
         </p:spPr>
         <p:txBody>
@@ -7081,29 +6601,22 @@
             </a:r>
           </a:p>
           <a:p>
-            <a:r>
-              <a:rPr lang="es-ES" smtClean="0"/>
-              <a:t>Reflexivo.</a:t>
+            <a:pPr lvl="1"/>
+            <a:r>
+              <a:rPr lang="es-ES" dirty="0"/>
+              <a:t> Multiplataforma.</a:t>
             </a:r>
             <a:endParaRPr lang="es-ES" dirty="0" smtClean="0"/>
           </a:p>
           <a:p>
+            <a:pPr lvl="1"/>
             <a:r>
               <a:rPr lang="es-ES" dirty="0" smtClean="0"/>
-              <a:t>Gestión de memoria.</a:t>
-            </a:r>
-          </a:p>
-          <a:p>
-            <a:r>
-              <a:rPr lang="es-ES" dirty="0"/>
-              <a:t>Multiplataforma</a:t>
-            </a:r>
-            <a:r>
-              <a:rPr lang="es-ES" dirty="0" smtClean="0"/>
-              <a:t>.</a:t>
-            </a:r>
-          </a:p>
-          <a:p>
+              <a:t>Reflexión.</a:t>
+            </a:r>
+          </a:p>
+          <a:p>
+            <a:pPr lvl="1"/>
             <a:r>
               <a:rPr lang="es-ES" dirty="0"/>
               <a:t>Uno de los más extendidos.</a:t>
@@ -7199,7 +6712,7 @@
         </p:blipFill>
         <p:spPr bwMode="auto">
           <a:xfrm>
-            <a:off x="4860032" y="3634882"/>
+            <a:off x="5148064" y="3356992"/>
             <a:ext cx="3619600" cy="1872208"/>
           </a:xfrm>
           <a:prstGeom prst="rect">
@@ -7248,7 +6761,7 @@
                             </p:stCondLst>
                             <p:childTnLst>
                               <p:par>
-                                <p:cTn id="5" presetID="1" presetClass="entr" presetSubtype="0" fill="hold" grpId="0" nodeType="clickEffect">
+                                <p:cTn id="5" presetID="1" presetClass="entr" presetSubtype="0" fill="hold" nodeType="clickEffect">
                                   <p:stCondLst>
                                     <p:cond delay="0"/>
                                   </p:stCondLst>
@@ -7297,7 +6810,7 @@
                             </p:stCondLst>
                             <p:childTnLst>
                               <p:par>
-                                <p:cTn id="9" presetID="1" presetClass="entr" presetSubtype="0" fill="hold" grpId="0" nodeType="clickEffect">
+                                <p:cTn id="9" presetID="1" presetClass="entr" presetSubtype="0" fill="hold" nodeType="clickEffect">
                                   <p:stCondLst>
                                     <p:cond delay="0"/>
                                   </p:stCondLst>
@@ -7327,6 +6840,110 @@
                                   </p:childTnLst>
                                 </p:cTn>
                               </p:par>
+                              <p:par>
+                                <p:cTn id="11" presetID="31" presetClass="entr" presetSubtype="0" fill="hold" nodeType="withEffect">
+                                  <p:stCondLst>
+                                    <p:cond delay="0"/>
+                                  </p:stCondLst>
+                                  <p:childTnLst>
+                                    <p:set>
+                                      <p:cBhvr>
+                                        <p:cTn id="12" dur="1" fill="hold">
+                                          <p:stCondLst>
+                                            <p:cond delay="0"/>
+                                          </p:stCondLst>
+                                        </p:cTn>
+                                        <p:tgtEl>
+                                          <p:spTgt spid="1027"/>
+                                        </p:tgtEl>
+                                        <p:attrNameLst>
+                                          <p:attrName>style.visibility</p:attrName>
+                                        </p:attrNameLst>
+                                      </p:cBhvr>
+                                      <p:to>
+                                        <p:strVal val="visible"/>
+                                      </p:to>
+                                    </p:set>
+                                    <p:anim calcmode="lin" valueType="num">
+                                      <p:cBhvr>
+                                        <p:cTn id="13" dur="1000" fill="hold"/>
+                                        <p:tgtEl>
+                                          <p:spTgt spid="1027"/>
+                                        </p:tgtEl>
+                                        <p:attrNameLst>
+                                          <p:attrName>ppt_w</p:attrName>
+                                        </p:attrNameLst>
+                                      </p:cBhvr>
+                                      <p:tavLst>
+                                        <p:tav tm="0">
+                                          <p:val>
+                                            <p:fltVal val="0"/>
+                                          </p:val>
+                                        </p:tav>
+                                        <p:tav tm="100000">
+                                          <p:val>
+                                            <p:strVal val="#ppt_w"/>
+                                          </p:val>
+                                        </p:tav>
+                                      </p:tavLst>
+                                    </p:anim>
+                                    <p:anim calcmode="lin" valueType="num">
+                                      <p:cBhvr>
+                                        <p:cTn id="14" dur="1000" fill="hold"/>
+                                        <p:tgtEl>
+                                          <p:spTgt spid="1027"/>
+                                        </p:tgtEl>
+                                        <p:attrNameLst>
+                                          <p:attrName>ppt_h</p:attrName>
+                                        </p:attrNameLst>
+                                      </p:cBhvr>
+                                      <p:tavLst>
+                                        <p:tav tm="0">
+                                          <p:val>
+                                            <p:fltVal val="0"/>
+                                          </p:val>
+                                        </p:tav>
+                                        <p:tav tm="100000">
+                                          <p:val>
+                                            <p:strVal val="#ppt_h"/>
+                                          </p:val>
+                                        </p:tav>
+                                      </p:tavLst>
+                                    </p:anim>
+                                    <p:anim calcmode="lin" valueType="num">
+                                      <p:cBhvr>
+                                        <p:cTn id="15" dur="1000" fill="hold"/>
+                                        <p:tgtEl>
+                                          <p:spTgt spid="1027"/>
+                                        </p:tgtEl>
+                                        <p:attrNameLst>
+                                          <p:attrName>style.rotation</p:attrName>
+                                        </p:attrNameLst>
+                                      </p:cBhvr>
+                                      <p:tavLst>
+                                        <p:tav tm="0">
+                                          <p:val>
+                                            <p:fltVal val="90"/>
+                                          </p:val>
+                                        </p:tav>
+                                        <p:tav tm="100000">
+                                          <p:val>
+                                            <p:fltVal val="0"/>
+                                          </p:val>
+                                        </p:tav>
+                                      </p:tavLst>
+                                    </p:anim>
+                                    <p:animEffect transition="in" filter="fade">
+                                      <p:cBhvr>
+                                        <p:cTn id="16" dur="1000"/>
+                                        <p:tgtEl>
+                                          <p:spTgt spid="1027"/>
+                                        </p:tgtEl>
+                                      </p:cBhvr>
+                                    </p:animEffect>
+                                  </p:childTnLst>
+                                </p:cTn>
+                              </p:par>
                             </p:childTnLst>
                           </p:cTn>
                         </p:par>
@@ -7334,26 +6951,26 @@
                     </p:cTn>
                   </p:par>
                   <p:par>
-                    <p:cTn id="11" fill="hold">
+                    <p:cTn id="17" fill="hold">
                       <p:stCondLst>
                         <p:cond delay="indefinite"/>
                       </p:stCondLst>
                       <p:childTnLst>
                         <p:par>
-                          <p:cTn id="12" fill="hold">
+                          <p:cTn id="18" fill="hold">
                             <p:stCondLst>
                               <p:cond delay="0"/>
                             </p:stCondLst>
                             <p:childTnLst>
                               <p:par>
-                                <p:cTn id="13" presetID="1" presetClass="entr" presetSubtype="0" fill="hold" grpId="0" nodeType="clickEffect">
+                                <p:cTn id="19" presetID="1" presetClass="entr" presetSubtype="0" fill="hold" nodeType="clickEffect">
                                   <p:stCondLst>
                                     <p:cond delay="0"/>
                                   </p:stCondLst>
                                   <p:childTnLst>
                                     <p:set>
                                       <p:cBhvr>
-                                        <p:cTn id="14" dur="1" fill="hold">
+                                        <p:cTn id="20" dur="1" fill="hold">
                                           <p:stCondLst>
                                             <p:cond delay="0"/>
                                           </p:stCondLst>
@@ -7383,26 +7000,26 @@
                     </p:cTn>
                   </p:par>
                   <p:par>
-                    <p:cTn id="15" fill="hold">
+                    <p:cTn id="21" fill="hold">
                       <p:stCondLst>
                         <p:cond delay="indefinite"/>
                       </p:stCondLst>
                       <p:childTnLst>
                         <p:par>
-                          <p:cTn id="16" fill="hold">
+                          <p:cTn id="22" fill="hold">
                             <p:stCondLst>
                               <p:cond delay="0"/>
                             </p:stCondLst>
                             <p:childTnLst>
                               <p:par>
-                                <p:cTn id="17" presetID="1" presetClass="entr" presetSubtype="0" fill="hold" grpId="0" nodeType="clickEffect">
+                                <p:cTn id="23" presetID="1" presetClass="entr" presetSubtype="0" fill="hold" nodeType="clickEffect">
                                   <p:stCondLst>
                                     <p:cond delay="0"/>
                                   </p:stCondLst>
                                   <p:childTnLst>
                                     <p:set>
                                       <p:cBhvr>
-                                        <p:cTn id="18" dur="1" fill="hold">
+                                        <p:cTn id="24" dur="1" fill="hold">
                                           <p:stCondLst>
                                             <p:cond delay="0"/>
                                           </p:stCondLst>
@@ -7411,159 +7028,6 @@
                                           <p:spTgt spid="3">
                                             <p:txEl>
                                               <p:pRg st="4" end="4"/>
-                                            </p:txEl>
-                                          </p:spTgt>
-                                        </p:tgtEl>
-                                        <p:attrNameLst>
-                                          <p:attrName>style.visibility</p:attrName>
-                                        </p:attrNameLst>
-                                      </p:cBhvr>
-                                      <p:to>
-                                        <p:strVal val="visible"/>
-                                      </p:to>
-                                    </p:set>
-                                  </p:childTnLst>
-                                </p:cTn>
-                              </p:par>
-                              <p:par>
-                                <p:cTn id="19" presetID="31" presetClass="entr" presetSubtype="0" fill="hold" nodeType="withEffect">
-                                  <p:stCondLst>
-                                    <p:cond delay="0"/>
-                                  </p:stCondLst>
-                                  <p:childTnLst>
-                                    <p:set>
-                                      <p:cBhvr>
-                                        <p:cTn id="20" dur="1" fill="hold">
-                                          <p:stCondLst>
-                                            <p:cond delay="0"/>
-                                          </p:stCondLst>
-                                        </p:cTn>
-                                        <p:tgtEl>
-                                          <p:spTgt spid="1027"/>
-                                        </p:tgtEl>
-                                        <p:attrNameLst>
-                                          <p:attrName>style.visibility</p:attrName>
-                                        </p:attrNameLst>
-                                      </p:cBhvr>
-                                      <p:to>
-                                        <p:strVal val="visible"/>
-                                      </p:to>
-                                    </p:set>
-                                    <p:anim calcmode="lin" valueType="num">
-                                      <p:cBhvr>
-                                        <p:cTn id="21" dur="1000" fill="hold"/>
-                                        <p:tgtEl>
-                                          <p:spTgt spid="1027"/>
-                                        </p:tgtEl>
-                                        <p:attrNameLst>
-                                          <p:attrName>ppt_w</p:attrName>
-                                        </p:attrNameLst>
-                                      </p:cBhvr>
-                                      <p:tavLst>
-                                        <p:tav tm="0">
-                                          <p:val>
-                                            <p:fltVal val="0"/>
-                                          </p:val>
-                                        </p:tav>
-                                        <p:tav tm="100000">
-                                          <p:val>
-                                            <p:strVal val="#ppt_w"/>
-                                          </p:val>
-                                        </p:tav>
-                                      </p:tavLst>
-                                    </p:anim>
-                                    <p:anim calcmode="lin" valueType="num">
-                                      <p:cBhvr>
-                                        <p:cTn id="22" dur="1000" fill="hold"/>
-                                        <p:tgtEl>
-                                          <p:spTgt spid="1027"/>
-                                        </p:tgtEl>
-                                        <p:attrNameLst>
-                                          <p:attrName>ppt_h</p:attrName>
-                                        </p:attrNameLst>
-                                      </p:cBhvr>
-                                      <p:tavLst>
-                                        <p:tav tm="0">
-                                          <p:val>
-                                            <p:fltVal val="0"/>
-                                          </p:val>
-                                        </p:tav>
-                                        <p:tav tm="100000">
-                                          <p:val>
-                                            <p:strVal val="#ppt_h"/>
-                                          </p:val>
-                                        </p:tav>
-                                      </p:tavLst>
-                                    </p:anim>
-                                    <p:anim calcmode="lin" valueType="num">
-                                      <p:cBhvr>
-                                        <p:cTn id="23" dur="1000" fill="hold"/>
-                                        <p:tgtEl>
-                                          <p:spTgt spid="1027"/>
-                                        </p:tgtEl>
-                                        <p:attrNameLst>
-                                          <p:attrName>style.rotation</p:attrName>
-                                        </p:attrNameLst>
-                                      </p:cBhvr>
-                                      <p:tavLst>
-                                        <p:tav tm="0">
-                                          <p:val>
-                                            <p:fltVal val="90"/>
-                                          </p:val>
-                                        </p:tav>
-                                        <p:tav tm="100000">
-                                          <p:val>
-                                            <p:fltVal val="0"/>
-                                          </p:val>
-                                        </p:tav>
-                                      </p:tavLst>
-                                    </p:anim>
-                                    <p:animEffect transition="in" filter="fade">
-                                      <p:cBhvr>
-                                        <p:cTn id="24" dur="1000"/>
-                                        <p:tgtEl>
-                                          <p:spTgt spid="1027"/>
-                                        </p:tgtEl>
-                                      </p:cBhvr>
-                                    </p:animEffect>
-                                  </p:childTnLst>
-                                </p:cTn>
-                              </p:par>
-                            </p:childTnLst>
-                          </p:cTn>
-                        </p:par>
-                      </p:childTnLst>
-                    </p:cTn>
-                  </p:par>
-                  <p:par>
-                    <p:cTn id="25" fill="hold">
-                      <p:stCondLst>
-                        <p:cond delay="indefinite"/>
-                      </p:stCondLst>
-                      <p:childTnLst>
-                        <p:par>
-                          <p:cTn id="26" fill="hold">
-                            <p:stCondLst>
-                              <p:cond delay="0"/>
-                            </p:stCondLst>
-                            <p:childTnLst>
-                              <p:par>
-                                <p:cTn id="27" presetID="1" presetClass="entr" presetSubtype="0" fill="hold" grpId="0" nodeType="clickEffect">
-                                  <p:stCondLst>
-                                    <p:cond delay="0"/>
-                                  </p:stCondLst>
-                                  <p:childTnLst>
-                                    <p:set>
-                                      <p:cBhvr>
-                                        <p:cTn id="28" dur="1" fill="hold">
-                                          <p:stCondLst>
-                                            <p:cond delay="0"/>
-                                          </p:stCondLst>
-                                        </p:cTn>
-                                        <p:tgtEl>
-                                          <p:spTgt spid="3">
-                                            <p:txEl>
-                                              <p:pRg st="5" end="5"/>
                                             </p:txEl>
                                           </p:spTgt>
                                         </p:tgtEl>
@@ -7605,301 +7069,11 @@
         </p:cTn>
       </p:par>
     </p:tnLst>
-    <p:bldLst>
-      <p:bldP spid="3" grpId="0" uiExpand="1" build="p"/>
-    </p:bldLst>
-  </p:timing>
-</p:sld>
-</file>
-
-<file path=ppt/slides/slide20.xml><?xml version="1.0" encoding="utf-8"?>
-<p:sld xmlns:a="http://schemas.openxmlformats.org/drawingml/2006/main" xmlns:r="http://schemas.openxmlformats.org/officeDocument/2006/relationships" xmlns:p="http://schemas.openxmlformats.org/presentationml/2006/main">
-  <p:cSld>
-    <p:spTree>
-      <p:nvGrpSpPr>
-        <p:cNvPr id="1" name=""/>
-        <p:cNvGrpSpPr/>
-        <p:nvPr/>
-      </p:nvGrpSpPr>
-      <p:grpSpPr>
-        <a:xfrm>
-          <a:off x="0" y="0"/>
-          <a:ext cx="0" cy="0"/>
-          <a:chOff x="0" y="0"/>
-          <a:chExt cx="0" cy="0"/>
-        </a:xfrm>
-      </p:grpSpPr>
-      <p:sp>
-        <p:nvSpPr>
-          <p:cNvPr id="2" name="1 Título"/>
-          <p:cNvSpPr>
-            <a:spLocks noGrp="1"/>
-          </p:cNvSpPr>
-          <p:nvPr>
-            <p:ph type="title"/>
-          </p:nvPr>
-        </p:nvSpPr>
-        <p:spPr>
-          <a:xfrm>
-            <a:off x="457200" y="704088"/>
-            <a:ext cx="8229600" cy="1500776"/>
-          </a:xfrm>
-        </p:spPr>
-        <p:txBody>
-          <a:bodyPr/>
-          <a:lstStyle/>
-          <a:p>
-            <a:pPr algn="ctr"/>
-            <a:r>
-              <a:rPr lang="es-ES" dirty="0" smtClean="0"/>
-              <a:t>Muchas gracias por su atención</a:t>
-            </a:r>
-            <a:endParaRPr lang="es-ES" dirty="0"/>
-          </a:p>
-        </p:txBody>
-      </p:sp>
-      <p:pic>
-        <p:nvPicPr>
-          <p:cNvPr id="6" name="Picture 2" descr="C:\Users\Saskya\Desktop\tecla_fin.jpg"/>
-          <p:cNvPicPr>
-            <a:picLocks noGrp="1" noChangeAspect="1" noChangeArrowheads="1"/>
-          </p:cNvPicPr>
-          <p:nvPr>
-            <p:ph idx="1"/>
-          </p:nvPr>
-        </p:nvPicPr>
-        <p:blipFill>
-          <a:blip r:embed="rId2">
-            <a:extLst>
-              <a:ext uri="{28A0092B-C50C-407E-A947-70E740481C1C}">
-                <a14:useLocalDpi xmlns:a14="http://schemas.microsoft.com/office/drawing/2010/main" val="0"/>
-              </a:ext>
-            </a:extLst>
-          </a:blip>
-          <a:srcRect/>
-          <a:stretch>
-            <a:fillRect/>
-          </a:stretch>
-        </p:blipFill>
-        <p:spPr bwMode="auto">
-          <a:xfrm>
-            <a:off x="2123728" y="2564904"/>
-            <a:ext cx="4752528" cy="3813903"/>
-          </a:xfrm>
-          <a:prstGeom prst="rect">
-            <a:avLst/>
-          </a:prstGeom>
-          <a:noFill/>
-          <a:extLst>
-            <a:ext uri="{909E8E84-426E-40DD-AFC4-6F175D3DCCD1}">
-              <a14:hiddenFill xmlns:a14="http://schemas.microsoft.com/office/drawing/2010/main">
-                <a:solidFill>
-                  <a:srgbClr val="FFFFFF"/>
-                </a:solidFill>
-              </a14:hiddenFill>
-            </a:ext>
-          </a:extLst>
-        </p:spPr>
-      </p:pic>
-    </p:spTree>
-    <p:extLst>
-      <p:ext uri="{BB962C8B-B14F-4D97-AF65-F5344CB8AC3E}">
-        <p14:creationId xmlns:p14="http://schemas.microsoft.com/office/powerpoint/2010/main" val="2318250775"/>
-      </p:ext>
-    </p:extLst>
-  </p:cSld>
-  <p:clrMapOvr>
-    <a:masterClrMapping/>
-  </p:clrMapOvr>
-  <p:timing>
-    <p:tnLst>
-      <p:par>
-        <p:cTn id="1" dur="indefinite" restart="never" nodeType="tmRoot"/>
-      </p:par>
-    </p:tnLst>
   </p:timing>
 </p:sld>
 </file>
 
 <file path=ppt/slides/slide3.xml><?xml version="1.0" encoding="utf-8"?>
-<p:sld xmlns:a="http://schemas.openxmlformats.org/drawingml/2006/main" xmlns:r="http://schemas.openxmlformats.org/officeDocument/2006/relationships" xmlns:p="http://schemas.openxmlformats.org/presentationml/2006/main">
-  <p:cSld>
-    <p:spTree>
-      <p:nvGrpSpPr>
-        <p:cNvPr id="1" name=""/>
-        <p:cNvGrpSpPr/>
-        <p:nvPr/>
-      </p:nvGrpSpPr>
-      <p:grpSpPr>
-        <a:xfrm>
-          <a:off x="0" y="0"/>
-          <a:ext cx="0" cy="0"/>
-          <a:chOff x="0" y="0"/>
-          <a:chExt cx="0" cy="0"/>
-        </a:xfrm>
-      </p:grpSpPr>
-      <p:sp>
-        <p:nvSpPr>
-          <p:cNvPr id="2" name="1 Título"/>
-          <p:cNvSpPr>
-            <a:spLocks noGrp="1"/>
-          </p:cNvSpPr>
-          <p:nvPr>
-            <p:ph type="title"/>
-          </p:nvPr>
-        </p:nvSpPr>
-        <p:spPr/>
-        <p:txBody>
-          <a:bodyPr/>
-          <a:lstStyle/>
-          <a:p>
-            <a:endParaRPr lang="es-ES" dirty="0"/>
-          </a:p>
-        </p:txBody>
-      </p:sp>
-      <p:pic>
-        <p:nvPicPr>
-          <p:cNvPr id="5" name="Picture 6" descr="C:\Users\Saskya\Desktop\52f51bf1e7c063b767000002_m.png"/>
-          <p:cNvPicPr>
-            <a:picLocks noGrp="1" noChangeAspect="1" noChangeArrowheads="1"/>
-          </p:cNvPicPr>
-          <p:nvPr>
-            <p:ph idx="1"/>
-          </p:nvPr>
-        </p:nvPicPr>
-        <p:blipFill>
-          <a:blip r:embed="rId2">
-            <a:extLst>
-              <a:ext uri="{28A0092B-C50C-407E-A947-70E740481C1C}">
-                <a14:useLocalDpi xmlns:a14="http://schemas.microsoft.com/office/drawing/2010/main" val="0"/>
-              </a:ext>
-            </a:extLst>
-          </a:blip>
-          <a:srcRect/>
-          <a:stretch>
-            <a:fillRect/>
-          </a:stretch>
-        </p:blipFill>
-        <p:spPr bwMode="auto">
-          <a:xfrm>
-            <a:off x="467544" y="1052735"/>
-            <a:ext cx="8172338" cy="5040561"/>
-          </a:xfrm>
-          <a:prstGeom prst="rect">
-            <a:avLst/>
-          </a:prstGeom>
-          <a:noFill/>
-          <a:extLst>
-            <a:ext uri="{909E8E84-426E-40DD-AFC4-6F175D3DCCD1}">
-              <a14:hiddenFill xmlns:a14="http://schemas.microsoft.com/office/drawing/2010/main">
-                <a:solidFill>
-                  <a:srgbClr val="FFFFFF"/>
-                </a:solidFill>
-              </a14:hiddenFill>
-            </a:ext>
-          </a:extLst>
-        </p:spPr>
-      </p:pic>
-    </p:spTree>
-    <p:extLst>
-      <p:ext uri="{BB962C8B-B14F-4D97-AF65-F5344CB8AC3E}">
-        <p14:creationId xmlns:p14="http://schemas.microsoft.com/office/powerpoint/2010/main" val="918622356"/>
-      </p:ext>
-    </p:extLst>
-  </p:cSld>
-  <p:clrMapOvr>
-    <a:masterClrMapping/>
-  </p:clrMapOvr>
-  <p:timing>
-    <p:tnLst>
-      <p:par>
-        <p:cTn id="1" dur="indefinite" restart="never" nodeType="tmRoot">
-          <p:childTnLst>
-            <p:seq concurrent="1" nextAc="seek">
-              <p:cTn id="2" dur="indefinite" nodeType="mainSeq">
-                <p:childTnLst>
-                  <p:par>
-                    <p:cTn id="3" fill="hold">
-                      <p:stCondLst>
-                        <p:cond delay="indefinite"/>
-                        <p:cond evt="onBegin" delay="0">
-                          <p:tn val="2"/>
-                        </p:cond>
-                      </p:stCondLst>
-                      <p:childTnLst>
-                        <p:par>
-                          <p:cTn id="4" fill="hold">
-                            <p:stCondLst>
-                              <p:cond delay="0"/>
-                            </p:stCondLst>
-                            <p:childTnLst>
-                              <p:par>
-                                <p:cTn id="5" presetID="21" presetClass="entr" presetSubtype="1" fill="hold" nodeType="withEffect">
-                                  <p:stCondLst>
-                                    <p:cond delay="0"/>
-                                  </p:stCondLst>
-                                  <p:childTnLst>
-                                    <p:set>
-                                      <p:cBhvr>
-                                        <p:cTn id="6" dur="1" fill="hold">
-                                          <p:stCondLst>
-                                            <p:cond delay="0"/>
-                                          </p:stCondLst>
-                                        </p:cTn>
-                                        <p:tgtEl>
-                                          <p:spTgt spid="5"/>
-                                        </p:tgtEl>
-                                        <p:attrNameLst>
-                                          <p:attrName>style.visibility</p:attrName>
-                                        </p:attrNameLst>
-                                      </p:cBhvr>
-                                      <p:to>
-                                        <p:strVal val="visible"/>
-                                      </p:to>
-                                    </p:set>
-                                    <p:animEffect transition="in" filter="wheel(1)">
-                                      <p:cBhvr>
-                                        <p:cTn id="7" dur="1000"/>
-                                        <p:tgtEl>
-                                          <p:spTgt spid="5"/>
-                                        </p:tgtEl>
-                                      </p:cBhvr>
-                                    </p:animEffect>
-                                  </p:childTnLst>
-                                </p:cTn>
-                              </p:par>
-                            </p:childTnLst>
-                          </p:cTn>
-                        </p:par>
-                      </p:childTnLst>
-                    </p:cTn>
-                  </p:par>
-                </p:childTnLst>
-              </p:cTn>
-              <p:prevCondLst>
-                <p:cond evt="onPrev" delay="0">
-                  <p:tgtEl>
-                    <p:sldTgt/>
-                  </p:tgtEl>
-                </p:cond>
-              </p:prevCondLst>
-              <p:nextCondLst>
-                <p:cond evt="onNext" delay="0">
-                  <p:tgtEl>
-                    <p:sldTgt/>
-                  </p:tgtEl>
-                </p:cond>
-              </p:nextCondLst>
-            </p:seq>
-          </p:childTnLst>
-        </p:cTn>
-      </p:par>
-    </p:tnLst>
-  </p:timing>
-</p:sld>
-</file>
-
-<file path=ppt/slides/slide4.xml><?xml version="1.0" encoding="utf-8"?>
 <p:sld xmlns:a="http://schemas.openxmlformats.org/drawingml/2006/main" xmlns:r="http://schemas.openxmlformats.org/officeDocument/2006/relationships" xmlns:p="http://schemas.openxmlformats.org/presentationml/2006/main">
   <p:cSld>
     <p:spTree>
@@ -8291,7 +7465,7 @@
 </p:sld>
 </file>
 
-<file path=ppt/slides/slide5.xml><?xml version="1.0" encoding="utf-8"?>
+<file path=ppt/slides/slide4.xml><?xml version="1.0" encoding="utf-8"?>
 <p:sld xmlns:a="http://schemas.openxmlformats.org/drawingml/2006/main" xmlns:r="http://schemas.openxmlformats.org/officeDocument/2006/relationships" xmlns:p="http://schemas.openxmlformats.org/presentationml/2006/main">
   <p:cSld>
     <p:spTree>
@@ -8383,7 +7557,7 @@
           <a:p>
             <a:r>
               <a:rPr lang="es-ES" dirty="0" smtClean="0"/>
-              <a:t>Ver los valores anteriores.</a:t>
+              <a:t>Ver los valores  anteriores.</a:t>
             </a:r>
           </a:p>
           <a:p>
@@ -8489,9 +7663,6 @@
                     <p:cTn id="3" fill="hold">
                       <p:stCondLst>
                         <p:cond delay="indefinite"/>
-                        <p:cond evt="onBegin" delay="0">
-                          <p:tn val="2"/>
-                        </p:cond>
                       </p:stCondLst>
                       <p:childTnLst>
                         <p:par>
@@ -8501,7 +7672,7 @@
                             </p:stCondLst>
                             <p:childTnLst>
                               <p:par>
-                                <p:cTn id="5" presetID="31" presetClass="entr" presetSubtype="0" fill="hold" nodeType="withEffect">
+                                <p:cTn id="5" presetID="1" presetClass="entr" presetSubtype="0" fill="hold" nodeType="clickEffect">
                                   <p:stCondLst>
                                     <p:cond delay="0"/>
                                   </p:stCondLst>
@@ -8514,7 +7685,11 @@
                                           </p:stCondLst>
                                         </p:cTn>
                                         <p:tgtEl>
-                                          <p:spTgt spid="3074"/>
+                                          <p:spTgt spid="3">
+                                            <p:txEl>
+                                              <p:pRg st="1" end="1"/>
+                                            </p:txEl>
+                                          </p:spTgt>
                                         </p:tgtEl>
                                         <p:attrNameLst>
                                           <p:attrName>style.visibility</p:attrName>
@@ -8524,83 +7699,55 @@
                                         <p:strVal val="visible"/>
                                       </p:to>
                                     </p:set>
-                                    <p:anim calcmode="lin" valueType="num">
+                                  </p:childTnLst>
+                                </p:cTn>
+                              </p:par>
+                            </p:childTnLst>
+                          </p:cTn>
+                        </p:par>
+                      </p:childTnLst>
+                    </p:cTn>
+                  </p:par>
+                  <p:par>
+                    <p:cTn id="7" fill="hold">
+                      <p:stCondLst>
+                        <p:cond delay="indefinite"/>
+                      </p:stCondLst>
+                      <p:childTnLst>
+                        <p:par>
+                          <p:cTn id="8" fill="hold">
+                            <p:stCondLst>
+                              <p:cond delay="0"/>
+                            </p:stCondLst>
+                            <p:childTnLst>
+                              <p:par>
+                                <p:cTn id="9" presetID="1" presetClass="entr" presetSubtype="0" fill="hold" nodeType="clickEffect">
+                                  <p:stCondLst>
+                                    <p:cond delay="0"/>
+                                  </p:stCondLst>
+                                  <p:childTnLst>
+                                    <p:set>
                                       <p:cBhvr>
-                                        <p:cTn id="7" dur="1000" fill="hold"/>
+                                        <p:cTn id="10" dur="1" fill="hold">
+                                          <p:stCondLst>
+                                            <p:cond delay="0"/>
+                                          </p:stCondLst>
+                                        </p:cTn>
                                         <p:tgtEl>
-                                          <p:spTgt spid="3074"/>
+                                          <p:spTgt spid="3">
+                                            <p:txEl>
+                                              <p:pRg st="2" end="2"/>
+                                            </p:txEl>
+                                          </p:spTgt>
                                         </p:tgtEl>
                                         <p:attrNameLst>
-                                          <p:attrName>ppt_w</p:attrName>
+                                          <p:attrName>style.visibility</p:attrName>
                                         </p:attrNameLst>
                                       </p:cBhvr>
-                                      <p:tavLst>
-                                        <p:tav tm="0">
-                                          <p:val>
-                                            <p:fltVal val="0"/>
-                                          </p:val>
-                                        </p:tav>
-                                        <p:tav tm="100000">
-                                          <p:val>
-                                            <p:strVal val="#ppt_w"/>
-                                          </p:val>
-                                        </p:tav>
-                                      </p:tavLst>
-                                    </p:anim>
-                                    <p:anim calcmode="lin" valueType="num">
-                                      <p:cBhvr>
-                                        <p:cTn id="8" dur="1000" fill="hold"/>
-                                        <p:tgtEl>
-                                          <p:spTgt spid="3074"/>
-                                        </p:tgtEl>
-                                        <p:attrNameLst>
-                                          <p:attrName>ppt_h</p:attrName>
-                                        </p:attrNameLst>
-                                      </p:cBhvr>
-                                      <p:tavLst>
-                                        <p:tav tm="0">
-                                          <p:val>
-                                            <p:fltVal val="0"/>
-                                          </p:val>
-                                        </p:tav>
-                                        <p:tav tm="100000">
-                                          <p:val>
-                                            <p:strVal val="#ppt_h"/>
-                                          </p:val>
-                                        </p:tav>
-                                      </p:tavLst>
-                                    </p:anim>
-                                    <p:anim calcmode="lin" valueType="num">
-                                      <p:cBhvr>
-                                        <p:cTn id="9" dur="1000" fill="hold"/>
-                                        <p:tgtEl>
-                                          <p:spTgt spid="3074"/>
-                                        </p:tgtEl>
-                                        <p:attrNameLst>
-                                          <p:attrName>style.rotation</p:attrName>
-                                        </p:attrNameLst>
-                                      </p:cBhvr>
-                                      <p:tavLst>
-                                        <p:tav tm="0">
-                                          <p:val>
-                                            <p:fltVal val="90"/>
-                                          </p:val>
-                                        </p:tav>
-                                        <p:tav tm="100000">
-                                          <p:val>
-                                            <p:fltVal val="0"/>
-                                          </p:val>
-                                        </p:tav>
-                                      </p:tavLst>
-                                    </p:anim>
-                                    <p:animEffect transition="in" filter="fade">
-                                      <p:cBhvr>
-                                        <p:cTn id="10" dur="1000"/>
-                                        <p:tgtEl>
-                                          <p:spTgt spid="3074"/>
-                                        </p:tgtEl>
-                                      </p:cBhvr>
-                                    </p:animEffect>
+                                      <p:to>
+                                        <p:strVal val="visible"/>
+                                      </p:to>
+                                    </p:set>
                                   </p:childTnLst>
                                 </p:cTn>
                               </p:par>
@@ -8638,7 +7785,7 @@
                                         <p:tgtEl>
                                           <p:spTgt spid="3">
                                             <p:txEl>
-                                              <p:pRg st="1" end="1"/>
+                                              <p:pRg st="3" end="3"/>
                                             </p:txEl>
                                           </p:spTgt>
                                         </p:tgtEl>
@@ -8687,7 +7834,7 @@
                                         <p:tgtEl>
                                           <p:spTgt spid="3">
                                             <p:txEl>
-                                              <p:pRg st="2" end="2"/>
+                                              <p:pRg st="4" end="4"/>
                                             </p:txEl>
                                           </p:spTgt>
                                         </p:tgtEl>
@@ -8736,7 +7883,7 @@
                                         <p:tgtEl>
                                           <p:spTgt spid="3">
                                             <p:txEl>
-                                              <p:pRg st="3" end="3"/>
+                                              <p:pRg st="5" end="5"/>
                                             </p:txEl>
                                           </p:spTgt>
                                         </p:tgtEl>
@@ -8751,43 +7898,21 @@
                                   </p:childTnLst>
                                 </p:cTn>
                               </p:par>
-                            </p:childTnLst>
-                          </p:cTn>
-                        </p:par>
-                      </p:childTnLst>
-                    </p:cTn>
-                  </p:par>
-                  <p:par>
-                    <p:cTn id="23" fill="hold">
-                      <p:stCondLst>
-                        <p:cond delay="indefinite"/>
-                      </p:stCondLst>
-                      <p:childTnLst>
-                        <p:par>
-                          <p:cTn id="24" fill="hold">
-                            <p:stCondLst>
-                              <p:cond delay="0"/>
-                            </p:stCondLst>
-                            <p:childTnLst>
                               <p:par>
-                                <p:cTn id="25" presetID="1" presetClass="entr" presetSubtype="0" fill="hold" nodeType="clickEffect">
+                                <p:cTn id="23" presetID="31" presetClass="entr" presetSubtype="0" fill="hold" nodeType="withEffect">
                                   <p:stCondLst>
                                     <p:cond delay="0"/>
                                   </p:stCondLst>
                                   <p:childTnLst>
                                     <p:set>
                                       <p:cBhvr>
-                                        <p:cTn id="26" dur="1" fill="hold">
+                                        <p:cTn id="24" dur="1" fill="hold">
                                           <p:stCondLst>
                                             <p:cond delay="0"/>
                                           </p:stCondLst>
                                         </p:cTn>
                                         <p:tgtEl>
-                                          <p:spTgt spid="3">
-                                            <p:txEl>
-                                              <p:pRg st="4" end="4"/>
-                                            </p:txEl>
-                                          </p:spTgt>
+                                          <p:spTgt spid="3074"/>
                                         </p:tgtEl>
                                         <p:attrNameLst>
                                           <p:attrName>style.visibility</p:attrName>
@@ -8797,55 +7922,83 @@
                                         <p:strVal val="visible"/>
                                       </p:to>
                                     </p:set>
-                                  </p:childTnLst>
-                                </p:cTn>
-                              </p:par>
-                            </p:childTnLst>
-                          </p:cTn>
-                        </p:par>
-                      </p:childTnLst>
-                    </p:cTn>
-                  </p:par>
-                  <p:par>
-                    <p:cTn id="27" fill="hold">
-                      <p:stCondLst>
-                        <p:cond delay="indefinite"/>
-                      </p:stCondLst>
-                      <p:childTnLst>
-                        <p:par>
-                          <p:cTn id="28" fill="hold">
-                            <p:stCondLst>
-                              <p:cond delay="0"/>
-                            </p:stCondLst>
-                            <p:childTnLst>
-                              <p:par>
-                                <p:cTn id="29" presetID="1" presetClass="entr" presetSubtype="0" fill="hold" nodeType="clickEffect">
-                                  <p:stCondLst>
-                                    <p:cond delay="0"/>
-                                  </p:stCondLst>
-                                  <p:childTnLst>
-                                    <p:set>
+                                    <p:anim calcmode="lin" valueType="num">
                                       <p:cBhvr>
-                                        <p:cTn id="30" dur="1" fill="hold">
-                                          <p:stCondLst>
-                                            <p:cond delay="0"/>
-                                          </p:stCondLst>
-                                        </p:cTn>
+                                        <p:cTn id="25" dur="1000" fill="hold"/>
                                         <p:tgtEl>
-                                          <p:spTgt spid="3">
-                                            <p:txEl>
-                                              <p:pRg st="5" end="5"/>
-                                            </p:txEl>
-                                          </p:spTgt>
+                                          <p:spTgt spid="3074"/>
                                         </p:tgtEl>
                                         <p:attrNameLst>
-                                          <p:attrName>style.visibility</p:attrName>
+                                          <p:attrName>ppt_w</p:attrName>
                                         </p:attrNameLst>
                                       </p:cBhvr>
-                                      <p:to>
-                                        <p:strVal val="visible"/>
-                                      </p:to>
-                                    </p:set>
+                                      <p:tavLst>
+                                        <p:tav tm="0">
+                                          <p:val>
+                                            <p:fltVal val="0"/>
+                                          </p:val>
+                                        </p:tav>
+                                        <p:tav tm="100000">
+                                          <p:val>
+                                            <p:strVal val="#ppt_w"/>
+                                          </p:val>
+                                        </p:tav>
+                                      </p:tavLst>
+                                    </p:anim>
+                                    <p:anim calcmode="lin" valueType="num">
+                                      <p:cBhvr>
+                                        <p:cTn id="26" dur="1000" fill="hold"/>
+                                        <p:tgtEl>
+                                          <p:spTgt spid="3074"/>
+                                        </p:tgtEl>
+                                        <p:attrNameLst>
+                                          <p:attrName>ppt_h</p:attrName>
+                                        </p:attrNameLst>
+                                      </p:cBhvr>
+                                      <p:tavLst>
+                                        <p:tav tm="0">
+                                          <p:val>
+                                            <p:fltVal val="0"/>
+                                          </p:val>
+                                        </p:tav>
+                                        <p:tav tm="100000">
+                                          <p:val>
+                                            <p:strVal val="#ppt_h"/>
+                                          </p:val>
+                                        </p:tav>
+                                      </p:tavLst>
+                                    </p:anim>
+                                    <p:anim calcmode="lin" valueType="num">
+                                      <p:cBhvr>
+                                        <p:cTn id="27" dur="1000" fill="hold"/>
+                                        <p:tgtEl>
+                                          <p:spTgt spid="3074"/>
+                                        </p:tgtEl>
+                                        <p:attrNameLst>
+                                          <p:attrName>style.rotation</p:attrName>
+                                        </p:attrNameLst>
+                                      </p:cBhvr>
+                                      <p:tavLst>
+                                        <p:tav tm="0">
+                                          <p:val>
+                                            <p:fltVal val="90"/>
+                                          </p:val>
+                                        </p:tav>
+                                        <p:tav tm="100000">
+                                          <p:val>
+                                            <p:fltVal val="0"/>
+                                          </p:val>
+                                        </p:tav>
+                                      </p:tavLst>
+                                    </p:anim>
+                                    <p:animEffect transition="in" filter="fade">
+                                      <p:cBhvr>
+                                        <p:cTn id="28" dur="1000"/>
+                                        <p:tgtEl>
+                                          <p:spTgt spid="3074"/>
+                                        </p:tgtEl>
+                                      </p:cBhvr>
+                                    </p:animEffect>
                                   </p:childTnLst>
                                 </p:cTn>
                               </p:par>
@@ -8880,7 +8033,7 @@
 </p:sld>
 </file>
 
-<file path=ppt/slides/slide6.xml><?xml version="1.0" encoding="utf-8"?>
+<file path=ppt/slides/slide5.xml><?xml version="1.0" encoding="utf-8"?>
 <p:sld xmlns:a="http://schemas.openxmlformats.org/drawingml/2006/main" xmlns:r="http://schemas.openxmlformats.org/officeDocument/2006/relationships" xmlns:p="http://schemas.openxmlformats.org/presentationml/2006/main">
   <p:cSld>
     <p:spTree>
@@ -8944,7 +8097,7 @@
           <a:p>
             <a:r>
               <a:rPr lang="es-ES" dirty="0" smtClean="0"/>
-              <a:t>Ofrecer una alternativa de depuración al modelo tradicional (paso a paso).</a:t>
+              <a:t>Ofrecer un complemento al modelo tradicional de depuración (paso a paso).</a:t>
             </a:r>
           </a:p>
           <a:p>
@@ -9287,6 +8440,482 @@
 </p:sld>
 </file>
 
+<file path=ppt/slides/slide6.xml><?xml version="1.0" encoding="utf-8"?>
+<p:sld xmlns:a="http://schemas.openxmlformats.org/drawingml/2006/main" xmlns:r="http://schemas.openxmlformats.org/officeDocument/2006/relationships" xmlns:p="http://schemas.openxmlformats.org/presentationml/2006/main">
+  <p:cSld>
+    <p:spTree>
+      <p:nvGrpSpPr>
+        <p:cNvPr id="1" name=""/>
+        <p:cNvGrpSpPr/>
+        <p:nvPr/>
+      </p:nvGrpSpPr>
+      <p:grpSpPr>
+        <a:xfrm>
+          <a:off x="0" y="0"/>
+          <a:ext cx="0" cy="0"/>
+          <a:chOff x="0" y="0"/>
+          <a:chExt cx="0" cy="0"/>
+        </a:xfrm>
+      </p:grpSpPr>
+      <p:sp>
+        <p:nvSpPr>
+          <p:cNvPr id="2" name="1 Título"/>
+          <p:cNvSpPr>
+            <a:spLocks noGrp="1"/>
+          </p:cNvSpPr>
+          <p:nvPr>
+            <p:ph type="title"/>
+          </p:nvPr>
+        </p:nvSpPr>
+        <p:spPr/>
+        <p:txBody>
+          <a:bodyPr/>
+          <a:lstStyle/>
+          <a:p>
+            <a:pPr algn="ctr"/>
+            <a:r>
+              <a:rPr lang="es-ES" dirty="0" smtClean="0"/>
+              <a:t>Profiler</a:t>
+            </a:r>
+            <a:endParaRPr lang="es-ES" dirty="0"/>
+          </a:p>
+        </p:txBody>
+      </p:sp>
+      <p:pic>
+        <p:nvPicPr>
+          <p:cNvPr id="6146" name="Picture 2" descr="C:\Users\Saskya\Desktop\XML-icon.png"/>
+          <p:cNvPicPr>
+            <a:picLocks noChangeAspect="1" noChangeArrowheads="1"/>
+          </p:cNvPicPr>
+          <p:nvPr/>
+        </p:nvPicPr>
+        <p:blipFill>
+          <a:blip r:embed="rId2">
+            <a:extLst>
+              <a:ext uri="{28A0092B-C50C-407E-A947-70E740481C1C}">
+                <a14:useLocalDpi xmlns:a14="http://schemas.microsoft.com/office/drawing/2010/main" val="0"/>
+              </a:ext>
+            </a:extLst>
+          </a:blip>
+          <a:srcRect/>
+          <a:stretch>
+            <a:fillRect/>
+          </a:stretch>
+        </p:blipFill>
+        <p:spPr bwMode="auto">
+          <a:xfrm>
+            <a:off x="7596336" y="3350185"/>
+            <a:ext cx="1358280" cy="1358280"/>
+          </a:xfrm>
+          <a:prstGeom prst="rect">
+            <a:avLst/>
+          </a:prstGeom>
+          <a:noFill/>
+          <a:extLst>
+            <a:ext uri="{909E8E84-426E-40DD-AFC4-6F175D3DCCD1}">
+              <a14:hiddenFill xmlns:a14="http://schemas.microsoft.com/office/drawing/2010/main">
+                <a:solidFill>
+                  <a:srgbClr val="FFFFFF"/>
+                </a:solidFill>
+              </a14:hiddenFill>
+            </a:ext>
+          </a:extLst>
+        </p:spPr>
+      </p:pic>
+      <p:pic>
+        <p:nvPicPr>
+          <p:cNvPr id="6147" name="Picture 3" descr="C:\Users\Saskya\Desktop\descarga.jpe"/>
+          <p:cNvPicPr>
+            <a:picLocks noChangeAspect="1" noChangeArrowheads="1"/>
+          </p:cNvPicPr>
+          <p:nvPr/>
+        </p:nvPicPr>
+        <p:blipFill>
+          <a:blip r:embed="rId3">
+            <a:extLst>
+              <a:ext uri="{28A0092B-C50C-407E-A947-70E740481C1C}">
+                <a14:useLocalDpi xmlns:a14="http://schemas.microsoft.com/office/drawing/2010/main" val="0"/>
+              </a:ext>
+            </a:extLst>
+          </a:blip>
+          <a:srcRect/>
+          <a:stretch>
+            <a:fillRect/>
+          </a:stretch>
+        </p:blipFill>
+        <p:spPr bwMode="auto">
+          <a:xfrm>
+            <a:off x="619956" y="4491845"/>
+            <a:ext cx="1008112" cy="1008112"/>
+          </a:xfrm>
+          <a:prstGeom prst="rect">
+            <a:avLst/>
+          </a:prstGeom>
+          <a:noFill/>
+          <a:extLst>
+            <a:ext uri="{909E8E84-426E-40DD-AFC4-6F175D3DCCD1}">
+              <a14:hiddenFill xmlns:a14="http://schemas.microsoft.com/office/drawing/2010/main">
+                <a:solidFill>
+                  <a:srgbClr val="FFFFFF"/>
+                </a:solidFill>
+              </a14:hiddenFill>
+            </a:ext>
+          </a:extLst>
+        </p:spPr>
+      </p:pic>
+      <p:pic>
+        <p:nvPicPr>
+          <p:cNvPr id="6148" name="Picture 4" descr="C:\Users\Saskya\Desktop\class_file_java.png"/>
+          <p:cNvPicPr>
+            <a:picLocks noGrp="1" noChangeAspect="1" noChangeArrowheads="1"/>
+          </p:cNvPicPr>
+          <p:nvPr>
+            <p:ph idx="1"/>
+          </p:nvPr>
+        </p:nvPicPr>
+        <p:blipFill>
+          <a:blip r:embed="rId4">
+            <a:extLst>
+              <a:ext uri="{28A0092B-C50C-407E-A947-70E740481C1C}">
+                <a14:useLocalDpi xmlns:a14="http://schemas.microsoft.com/office/drawing/2010/main" val="0"/>
+              </a:ext>
+            </a:extLst>
+          </a:blip>
+          <a:srcRect/>
+          <a:stretch>
+            <a:fillRect/>
+          </a:stretch>
+        </p:blipFill>
+        <p:spPr bwMode="auto">
+          <a:xfrm>
+            <a:off x="485156" y="2435823"/>
+            <a:ext cx="1238042" cy="1238042"/>
+          </a:xfrm>
+          <a:prstGeom prst="rect">
+            <a:avLst/>
+          </a:prstGeom>
+          <a:noFill/>
+          <a:extLst>
+            <a:ext uri="{909E8E84-426E-40DD-AFC4-6F175D3DCCD1}">
+              <a14:hiddenFill xmlns:a14="http://schemas.microsoft.com/office/drawing/2010/main">
+                <a:solidFill>
+                  <a:srgbClr val="FFFFFF"/>
+                </a:solidFill>
+              </a14:hiddenFill>
+            </a:ext>
+          </a:extLst>
+        </p:spPr>
+      </p:pic>
+      <p:sp>
+        <p:nvSpPr>
+          <p:cNvPr id="5" name="4 CuadroTexto"/>
+          <p:cNvSpPr txBox="1"/>
+          <p:nvPr/>
+        </p:nvSpPr>
+        <p:spPr>
+          <a:xfrm>
+            <a:off x="3923320" y="3736937"/>
+            <a:ext cx="2180250" cy="584775"/>
+          </a:xfrm>
+          <a:prstGeom prst="rect">
+            <a:avLst/>
+          </a:prstGeom>
+        </p:spPr>
+        <p:style>
+          <a:lnRef idx="1">
+            <a:schemeClr val="dk1"/>
+          </a:lnRef>
+          <a:fillRef idx="1002">
+            <a:schemeClr val="dk2"/>
+          </a:fillRef>
+          <a:effectRef idx="1">
+            <a:schemeClr val="dk1"/>
+          </a:effectRef>
+          <a:fontRef idx="minor">
+            <a:schemeClr val="dk1"/>
+          </a:fontRef>
+        </p:style>
+        <p:txBody>
+          <a:bodyPr wrap="square" rtlCol="0">
+            <a:spAutoFit/>
+          </a:bodyPr>
+          <a:lstStyle/>
+          <a:p>
+            <a:r>
+              <a:rPr lang="es-ES" sz="2800" dirty="0" smtClean="0"/>
+              <a:t> </a:t>
+            </a:r>
+            <a:r>
+              <a:rPr lang="es-ES" sz="3200" dirty="0" smtClean="0">
+                <a:solidFill>
+                  <a:schemeClr val="bg1"/>
+                </a:solidFill>
+                <a:effectLst>
+                  <a:outerShdw blurRad="38100" dist="38100" dir="2700000" algn="tl">
+                    <a:srgbClr val="000000">
+                      <a:alpha val="43137"/>
+                    </a:srgbClr>
+                  </a:outerShdw>
+                </a:effectLst>
+              </a:rPr>
+              <a:t>PROFILER</a:t>
+            </a:r>
+            <a:endParaRPr lang="es-ES" sz="3200" dirty="0">
+              <a:solidFill>
+                <a:schemeClr val="bg1"/>
+              </a:solidFill>
+              <a:effectLst>
+                <a:outerShdw blurRad="38100" dist="38100" dir="2700000" algn="tl">
+                  <a:srgbClr val="000000">
+                    <a:alpha val="43137"/>
+                  </a:srgbClr>
+                </a:outerShdw>
+              </a:effectLst>
+            </a:endParaRPr>
+          </a:p>
+        </p:txBody>
+      </p:sp>
+      <p:sp>
+        <p:nvSpPr>
+          <p:cNvPr id="6" name="5 CuadroTexto"/>
+          <p:cNvSpPr txBox="1"/>
+          <p:nvPr/>
+        </p:nvSpPr>
+        <p:spPr>
+          <a:xfrm>
+            <a:off x="477104" y="3568017"/>
+            <a:ext cx="1804405" cy="430887"/>
+          </a:xfrm>
+          <a:prstGeom prst="rect">
+            <a:avLst/>
+          </a:prstGeom>
+          <a:noFill/>
+        </p:spPr>
+        <p:txBody>
+          <a:bodyPr wrap="none" rtlCol="0">
+            <a:spAutoFit/>
+          </a:bodyPr>
+          <a:lstStyle/>
+          <a:p>
+            <a:r>
+              <a:rPr lang="es-ES" sz="2200" dirty="0" smtClean="0">
+                <a:effectLst>
+                  <a:outerShdw blurRad="38100" dist="38100" dir="2700000" algn="tl">
+                    <a:srgbClr val="000000">
+                      <a:alpha val="43137"/>
+                    </a:srgbClr>
+                  </a:outerShdw>
+                </a:effectLst>
+              </a:rPr>
+              <a:t>Fichero .class</a:t>
+            </a:r>
+            <a:endParaRPr lang="es-ES" sz="2200" dirty="0">
+              <a:effectLst>
+                <a:outerShdw blurRad="38100" dist="38100" dir="2700000" algn="tl">
+                  <a:srgbClr val="000000">
+                    <a:alpha val="43137"/>
+                  </a:srgbClr>
+                </a:outerShdw>
+              </a:effectLst>
+            </a:endParaRPr>
+          </a:p>
+        </p:txBody>
+      </p:sp>
+      <p:sp>
+        <p:nvSpPr>
+          <p:cNvPr id="7" name="6 CuadroTexto"/>
+          <p:cNvSpPr txBox="1"/>
+          <p:nvPr/>
+        </p:nvSpPr>
+        <p:spPr>
+          <a:xfrm>
+            <a:off x="536989" y="5733256"/>
+            <a:ext cx="2954891" cy="430887"/>
+          </a:xfrm>
+          <a:prstGeom prst="rect">
+            <a:avLst/>
+          </a:prstGeom>
+          <a:noFill/>
+        </p:spPr>
+        <p:txBody>
+          <a:bodyPr wrap="square" rtlCol="0">
+            <a:spAutoFit/>
+          </a:bodyPr>
+          <a:lstStyle/>
+          <a:p>
+            <a:r>
+              <a:rPr lang="es-ES" sz="2200" dirty="0" smtClean="0">
+                <a:effectLst>
+                  <a:outerShdw blurRad="38100" dist="38100" dir="2700000" algn="tl">
+                    <a:srgbClr val="000000">
+                      <a:alpha val="43137"/>
+                    </a:srgbClr>
+                  </a:outerShdw>
+                </a:effectLst>
+              </a:rPr>
+              <a:t>Fichero .jar ejecutable</a:t>
+            </a:r>
+            <a:endParaRPr lang="es-ES" sz="2200" dirty="0">
+              <a:effectLst>
+                <a:outerShdw blurRad="38100" dist="38100" dir="2700000" algn="tl">
+                  <a:srgbClr val="000000">
+                    <a:alpha val="43137"/>
+                  </a:srgbClr>
+                </a:outerShdw>
+              </a:effectLst>
+            </a:endParaRPr>
+          </a:p>
+        </p:txBody>
+      </p:sp>
+      <p:sp>
+        <p:nvSpPr>
+          <p:cNvPr id="12" name="11 Flecha derecha"/>
+          <p:cNvSpPr/>
+          <p:nvPr/>
+        </p:nvSpPr>
+        <p:spPr>
+          <a:xfrm>
+            <a:off x="6228184" y="3745938"/>
+            <a:ext cx="1440160" cy="575774"/>
+          </a:xfrm>
+          <a:prstGeom prst="rightArrow">
+            <a:avLst/>
+          </a:prstGeom>
+        </p:spPr>
+        <p:style>
+          <a:lnRef idx="2">
+            <a:schemeClr val="accent1">
+              <a:shade val="50000"/>
+            </a:schemeClr>
+          </a:lnRef>
+          <a:fillRef idx="1">
+            <a:schemeClr val="accent1"/>
+          </a:fillRef>
+          <a:effectRef idx="0">
+            <a:schemeClr val="accent1"/>
+          </a:effectRef>
+          <a:fontRef idx="minor">
+            <a:schemeClr val="lt1"/>
+          </a:fontRef>
+        </p:style>
+        <p:txBody>
+          <a:bodyPr rtlCol="0" anchor="ctr"/>
+          <a:lstStyle/>
+          <a:p>
+            <a:pPr algn="ctr"/>
+            <a:endParaRPr lang="es-ES"/>
+          </a:p>
+        </p:txBody>
+      </p:sp>
+      <p:sp>
+        <p:nvSpPr>
+          <p:cNvPr id="19" name="18 Flecha derecha"/>
+          <p:cNvSpPr/>
+          <p:nvPr/>
+        </p:nvSpPr>
+        <p:spPr>
+          <a:xfrm rot="1448374">
+            <a:off x="1936775" y="3134161"/>
+            <a:ext cx="2035937" cy="432048"/>
+          </a:xfrm>
+          <a:prstGeom prst="rightArrow">
+            <a:avLst>
+              <a:gd name="adj1" fmla="val 50000"/>
+              <a:gd name="adj2" fmla="val 52800"/>
+            </a:avLst>
+          </a:prstGeom>
+        </p:spPr>
+        <p:style>
+          <a:lnRef idx="2">
+            <a:schemeClr val="accent1">
+              <a:shade val="50000"/>
+            </a:schemeClr>
+          </a:lnRef>
+          <a:fillRef idx="1">
+            <a:schemeClr val="accent1"/>
+          </a:fillRef>
+          <a:effectRef idx="0">
+            <a:schemeClr val="accent1"/>
+          </a:effectRef>
+          <a:fontRef idx="minor">
+            <a:schemeClr val="lt1"/>
+          </a:fontRef>
+        </p:style>
+        <p:txBody>
+          <a:bodyPr rtlCol="0" anchor="ctr"/>
+          <a:lstStyle/>
+          <a:p>
+            <a:pPr algn="ctr"/>
+            <a:endParaRPr lang="es-ES"/>
+          </a:p>
+        </p:txBody>
+      </p:sp>
+      <p:sp>
+        <p:nvSpPr>
+          <p:cNvPr id="20" name="19 Flecha derecha"/>
+          <p:cNvSpPr/>
+          <p:nvPr/>
+        </p:nvSpPr>
+        <p:spPr>
+          <a:xfrm rot="20151626" flipV="1">
+            <a:off x="1936774" y="4513444"/>
+            <a:ext cx="2035937" cy="432048"/>
+          </a:xfrm>
+          <a:prstGeom prst="rightArrow">
+            <a:avLst>
+              <a:gd name="adj1" fmla="val 50000"/>
+              <a:gd name="adj2" fmla="val 52800"/>
+            </a:avLst>
+          </a:prstGeom>
+          <a:effectLst>
+            <a:reflection endPos="0" dist="50800" dir="5400000" sy="-100000" algn="bl" rotWithShape="0"/>
+          </a:effectLst>
+        </p:spPr>
+        <p:style>
+          <a:lnRef idx="2">
+            <a:schemeClr val="accent1">
+              <a:shade val="50000"/>
+            </a:schemeClr>
+          </a:lnRef>
+          <a:fillRef idx="1">
+            <a:schemeClr val="accent1"/>
+          </a:fillRef>
+          <a:effectRef idx="0">
+            <a:schemeClr val="accent1"/>
+          </a:effectRef>
+          <a:fontRef idx="minor">
+            <a:schemeClr val="lt1"/>
+          </a:fontRef>
+        </p:style>
+        <p:txBody>
+          <a:bodyPr rtlCol="0" anchor="ctr"/>
+          <a:lstStyle/>
+          <a:p>
+            <a:pPr algn="ctr"/>
+            <a:endParaRPr lang="es-ES"/>
+          </a:p>
+        </p:txBody>
+      </p:sp>
+    </p:spTree>
+    <p:extLst>
+      <p:ext uri="{BB962C8B-B14F-4D97-AF65-F5344CB8AC3E}">
+        <p14:creationId xmlns:p14="http://schemas.microsoft.com/office/powerpoint/2010/main" val="2412826116"/>
+      </p:ext>
+    </p:extLst>
+  </p:cSld>
+  <p:clrMapOvr>
+    <a:masterClrMapping/>
+  </p:clrMapOvr>
+  <p:timing>
+    <p:tnLst>
+      <p:par>
+        <p:cTn id="1" dur="indefinite" restart="never" nodeType="tmRoot"/>
+      </p:par>
+    </p:tnLst>
+  </p:timing>
+</p:sld>
+</file>
+
 <file path=ppt/slides/slide7.xml><?xml version="1.0" encoding="utf-8"?>
 <p:sld xmlns:a="http://schemas.openxmlformats.org/drawingml/2006/main" xmlns:r="http://schemas.openxmlformats.org/officeDocument/2006/relationships" xmlns:p="http://schemas.openxmlformats.org/presentationml/2006/main">
   <p:cSld>
@@ -9945,32 +9574,15 @@
           </a:p>
         </p:txBody>
       </p:sp>
-      <p:sp>
-        <p:nvSpPr>
-          <p:cNvPr id="3" name="2 Marcador de contenido"/>
-          <p:cNvSpPr>
-            <a:spLocks noGrp="1"/>
-          </p:cNvSpPr>
-          <p:nvPr>
-            <p:ph idx="1"/>
-          </p:nvPr>
-        </p:nvSpPr>
-        <p:spPr/>
-        <p:txBody>
-          <a:bodyPr/>
-          <a:lstStyle/>
-          <a:p>
-            <a:endParaRPr lang="es-ES" dirty="0"/>
-          </a:p>
-        </p:txBody>
-      </p:sp>
       <p:pic>
         <p:nvPicPr>
-          <p:cNvPr id="8196" name="Picture 4"/>
+          <p:cNvPr id="5" name="Picture 4"/>
           <p:cNvPicPr>
-            <a:picLocks noChangeAspect="1" noChangeArrowheads="1"/>
+            <a:picLocks noGrp="1" noChangeAspect="1" noChangeArrowheads="1"/>
           </p:cNvPicPr>
-          <p:nvPr/>
+          <p:nvPr>
+            <p:ph idx="1"/>
+          </p:nvPr>
         </p:nvPicPr>
         <p:blipFill rotWithShape="1">
           <a:blip r:embed="rId2">
@@ -9985,8 +9597,8 @@
         </p:blipFill>
         <p:spPr bwMode="auto">
           <a:xfrm>
-            <a:off x="323528" y="2558048"/>
-            <a:ext cx="8498081" cy="3384376"/>
+            <a:off x="467544" y="2636912"/>
+            <a:ext cx="7977876" cy="3176542"/>
           </a:xfrm>
           <a:prstGeom prst="rect">
             <a:avLst/>

</xml_diff>

<commit_message>
cambiado orden de transparencias
</commit_message>
<xml_diff>
--- a/JavaTracer/Analizador orientado a métodos para aplicaciones Java.pptx
+++ b/JavaTracer/Analizador orientado a métodos para aplicaciones Java.pptx
@@ -14,13 +14,13 @@
     <p:sldId id="260" r:id="rId5"/>
     <p:sldId id="261" r:id="rId6"/>
     <p:sldId id="276" r:id="rId7"/>
-    <p:sldId id="262" r:id="rId8"/>
-    <p:sldId id="263" r:id="rId9"/>
-    <p:sldId id="265" r:id="rId10"/>
-    <p:sldId id="266" r:id="rId11"/>
-    <p:sldId id="264" r:id="rId12"/>
-    <p:sldId id="267" r:id="rId13"/>
-    <p:sldId id="268" r:id="rId14"/>
+    <p:sldId id="264" r:id="rId8"/>
+    <p:sldId id="267" r:id="rId9"/>
+    <p:sldId id="268" r:id="rId10"/>
+    <p:sldId id="262" r:id="rId11"/>
+    <p:sldId id="263" r:id="rId12"/>
+    <p:sldId id="265" r:id="rId13"/>
+    <p:sldId id="266" r:id="rId14"/>
     <p:sldId id="269" r:id="rId15"/>
     <p:sldId id="270" r:id="rId16"/>
     <p:sldId id="271" r:id="rId17"/>
@@ -210,6 +210,7 @@
           <a:p>
             <a:fld id="{B592FC02-FB55-47CF-9ADD-6BDD472EB8D7}" type="datetimeFigureOut">
               <a:rPr lang="es-ES" smtClean="0"/>
+              <a:pPr/>
               <a:t>29/06/2014</a:t>
             </a:fld>
             <a:endParaRPr lang="es-ES"/>
@@ -369,6 +370,7 @@
           <a:p>
             <a:fld id="{D19F484E-F6FE-40CD-9A54-618DF77A1650}" type="slidenum">
               <a:rPr lang="es-ES" smtClean="0"/>
+              <a:pPr/>
               <a:t>‹Nº›</a:t>
             </a:fld>
             <a:endParaRPr lang="es-ES"/>
@@ -378,7 +380,7 @@
     </p:spTree>
     <p:extLst>
       <p:ext uri="{BB962C8B-B14F-4D97-AF65-F5344CB8AC3E}">
-        <p14:creationId xmlns:p14="http://schemas.microsoft.com/office/powerpoint/2010/main" val="1013968162"/>
+        <p14:creationId xmlns:p14="http://schemas.microsoft.com/office/powerpoint/2010/main" xmlns="" val="1013968162"/>
       </p:ext>
     </p:extLst>
   </p:cSld>
@@ -651,6 +653,7 @@
           <a:p>
             <a:fld id="{D69C4018-7936-412E-AFA4-452A58F224F4}" type="datetimeFigureOut">
               <a:rPr lang="es-ES" smtClean="0"/>
+              <a:pPr/>
               <a:t>29/06/2014</a:t>
             </a:fld>
             <a:endParaRPr lang="es-ES"/>
@@ -693,6 +696,7 @@
           <a:p>
             <a:fld id="{0F7C4CBB-9D67-435E-951E-6360B1C5F78A}" type="slidenum">
               <a:rPr lang="es-ES" smtClean="0"/>
+              <a:pPr/>
               <a:t>‹Nº›</a:t>
             </a:fld>
             <a:endParaRPr lang="es-ES"/>
@@ -816,6 +820,7 @@
           <a:p>
             <a:fld id="{D69C4018-7936-412E-AFA4-452A58F224F4}" type="datetimeFigureOut">
               <a:rPr lang="es-ES" smtClean="0"/>
+              <a:pPr/>
               <a:t>29/06/2014</a:t>
             </a:fld>
             <a:endParaRPr lang="es-ES"/>
@@ -858,6 +863,7 @@
           <a:p>
             <a:fld id="{0F7C4CBB-9D67-435E-951E-6360B1C5F78A}" type="slidenum">
               <a:rPr lang="es-ES" smtClean="0"/>
+              <a:pPr/>
               <a:t>‹Nº›</a:t>
             </a:fld>
             <a:endParaRPr lang="es-ES"/>
@@ -991,6 +997,7 @@
           <a:p>
             <a:fld id="{D69C4018-7936-412E-AFA4-452A58F224F4}" type="datetimeFigureOut">
               <a:rPr lang="es-ES" smtClean="0"/>
+              <a:pPr/>
               <a:t>29/06/2014</a:t>
             </a:fld>
             <a:endParaRPr lang="es-ES"/>
@@ -1033,6 +1040,7 @@
           <a:p>
             <a:fld id="{0F7C4CBB-9D67-435E-951E-6360B1C5F78A}" type="slidenum">
               <a:rPr lang="es-ES" smtClean="0"/>
+              <a:pPr/>
               <a:t>‹Nº›</a:t>
             </a:fld>
             <a:endParaRPr lang="es-ES"/>
@@ -1156,6 +1164,7 @@
           <a:p>
             <a:fld id="{D69C4018-7936-412E-AFA4-452A58F224F4}" type="datetimeFigureOut">
               <a:rPr lang="es-ES" smtClean="0"/>
+              <a:pPr/>
               <a:t>29/06/2014</a:t>
             </a:fld>
             <a:endParaRPr lang="es-ES"/>
@@ -1198,6 +1207,7 @@
           <a:p>
             <a:fld id="{0F7C4CBB-9D67-435E-951E-6360B1C5F78A}" type="slidenum">
               <a:rPr lang="es-ES" smtClean="0"/>
+              <a:pPr/>
               <a:t>‹Nº›</a:t>
             </a:fld>
             <a:endParaRPr lang="es-ES"/>
@@ -1398,6 +1408,7 @@
           <a:p>
             <a:fld id="{D69C4018-7936-412E-AFA4-452A58F224F4}" type="datetimeFigureOut">
               <a:rPr lang="es-ES" smtClean="0"/>
+              <a:pPr/>
               <a:t>29/06/2014</a:t>
             </a:fld>
             <a:endParaRPr lang="es-ES"/>
@@ -1440,6 +1451,7 @@
           <a:p>
             <a:fld id="{0F7C4CBB-9D67-435E-951E-6360B1C5F78A}" type="slidenum">
               <a:rPr lang="es-ES" smtClean="0"/>
+              <a:pPr/>
               <a:t>‹Nº›</a:t>
             </a:fld>
             <a:endParaRPr lang="es-ES"/>
@@ -1662,6 +1674,7 @@
           <a:p>
             <a:fld id="{D69C4018-7936-412E-AFA4-452A58F224F4}" type="datetimeFigureOut">
               <a:rPr lang="es-ES" smtClean="0"/>
+              <a:pPr/>
               <a:t>29/06/2014</a:t>
             </a:fld>
             <a:endParaRPr lang="es-ES"/>
@@ -1704,6 +1717,7 @@
           <a:p>
             <a:fld id="{0F7C4CBB-9D67-435E-951E-6360B1C5F78A}" type="slidenum">
               <a:rPr lang="es-ES" smtClean="0"/>
+              <a:pPr/>
               <a:t>‹Nº›</a:t>
             </a:fld>
             <a:endParaRPr lang="es-ES"/>
@@ -2040,6 +2054,7 @@
           <a:p>
             <a:fld id="{D69C4018-7936-412E-AFA4-452A58F224F4}" type="datetimeFigureOut">
               <a:rPr lang="es-ES" smtClean="0"/>
+              <a:pPr/>
               <a:t>29/06/2014</a:t>
             </a:fld>
             <a:endParaRPr lang="es-ES"/>
@@ -2082,6 +2097,7 @@
           <a:p>
             <a:fld id="{0F7C4CBB-9D67-435E-951E-6360B1C5F78A}" type="slidenum">
               <a:rPr lang="es-ES" smtClean="0"/>
+              <a:pPr/>
               <a:t>‹Nº›</a:t>
             </a:fld>
             <a:endParaRPr lang="es-ES"/>
@@ -2190,6 +2206,7 @@
           <a:p>
             <a:fld id="{D69C4018-7936-412E-AFA4-452A58F224F4}" type="datetimeFigureOut">
               <a:rPr lang="es-ES" smtClean="0"/>
+              <a:pPr/>
               <a:t>29/06/2014</a:t>
             </a:fld>
             <a:endParaRPr lang="es-ES"/>
@@ -2232,6 +2249,7 @@
           <a:p>
             <a:fld id="{0F7C4CBB-9D67-435E-951E-6360B1C5F78A}" type="slidenum">
               <a:rPr lang="es-ES" smtClean="0"/>
+              <a:pPr/>
               <a:t>‹Nº›</a:t>
             </a:fld>
             <a:endParaRPr lang="es-ES"/>
@@ -2280,6 +2298,7 @@
           <a:p>
             <a:fld id="{D69C4018-7936-412E-AFA4-452A58F224F4}" type="datetimeFigureOut">
               <a:rPr lang="es-ES" smtClean="0"/>
+              <a:pPr/>
               <a:t>29/06/2014</a:t>
             </a:fld>
             <a:endParaRPr lang="es-ES"/>
@@ -2322,6 +2341,7 @@
           <a:p>
             <a:fld id="{0F7C4CBB-9D67-435E-951E-6360B1C5F78A}" type="slidenum">
               <a:rPr lang="es-ES" smtClean="0"/>
+              <a:pPr/>
               <a:t>‹Nº›</a:t>
             </a:fld>
             <a:endParaRPr lang="es-ES"/>
@@ -2541,6 +2561,7 @@
           <a:p>
             <a:fld id="{D69C4018-7936-412E-AFA4-452A58F224F4}" type="datetimeFigureOut">
               <a:rPr lang="es-ES" smtClean="0"/>
+              <a:pPr/>
               <a:t>29/06/2014</a:t>
             </a:fld>
             <a:endParaRPr lang="es-ES"/>
@@ -2583,6 +2604,7 @@
           <a:p>
             <a:fld id="{0F7C4CBB-9D67-435E-951E-6360B1C5F78A}" type="slidenum">
               <a:rPr lang="es-ES" smtClean="0"/>
+              <a:pPr/>
               <a:t>‹Nº›</a:t>
             </a:fld>
             <a:endParaRPr lang="es-ES"/>
@@ -2829,6 +2851,7 @@
           <a:p>
             <a:fld id="{D69C4018-7936-412E-AFA4-452A58F224F4}" type="datetimeFigureOut">
               <a:rPr lang="es-ES" smtClean="0"/>
+              <a:pPr/>
               <a:t>29/06/2014</a:t>
             </a:fld>
             <a:endParaRPr lang="es-ES"/>
@@ -2876,6 +2899,7 @@
           <a:p>
             <a:fld id="{0F7C4CBB-9D67-435E-951E-6360B1C5F78A}" type="slidenum">
               <a:rPr lang="es-ES" smtClean="0"/>
+              <a:pPr/>
               <a:t>‹Nº›</a:t>
             </a:fld>
             <a:endParaRPr lang="es-ES"/>
@@ -3600,6 +3624,7 @@
           <a:p>
             <a:fld id="{D69C4018-7936-412E-AFA4-452A58F224F4}" type="datetimeFigureOut">
               <a:rPr lang="es-ES" smtClean="0"/>
+              <a:pPr/>
               <a:t>29/06/2014</a:t>
             </a:fld>
             <a:endParaRPr lang="es-ES"/>
@@ -3678,6 +3703,7 @@
           <a:p>
             <a:fld id="{0F7C4CBB-9D67-435E-951E-6360B1C5F78A}" type="slidenum">
               <a:rPr lang="es-ES" smtClean="0"/>
+              <a:pPr/>
               <a:t>‹Nº›</a:t>
             </a:fld>
             <a:endParaRPr lang="es-ES"/>
@@ -4302,7 +4328,7 @@
           <a:blip r:embed="rId2" cstate="print">
             <a:extLst>
               <a:ext uri="{28A0092B-C50C-407E-A947-70E740481C1C}">
-                <a14:useLocalDpi xmlns:a14="http://schemas.microsoft.com/office/drawing/2010/main" val="0"/>
+                <a14:useLocalDpi xmlns:a14="http://schemas.microsoft.com/office/drawing/2010/main" xmlns="" val="0"/>
               </a:ext>
             </a:extLst>
           </a:blip>
@@ -4322,7 +4348,7 @@
           <a:noFill/>
           <a:extLst>
             <a:ext uri="{909E8E84-426E-40DD-AFC4-6F175D3DCCD1}">
-              <a14:hiddenFill xmlns:a14="http://schemas.microsoft.com/office/drawing/2010/main">
+              <a14:hiddenFill xmlns:a14="http://schemas.microsoft.com/office/drawing/2010/main" xmlns="">
                 <a:solidFill>
                   <a:srgbClr val="FFFFFF"/>
                 </a:solidFill>
@@ -4334,7 +4360,7 @@
     </p:spTree>
     <p:extLst>
       <p:ext uri="{BB962C8B-B14F-4D97-AF65-F5344CB8AC3E}">
-        <p14:creationId xmlns:p14="http://schemas.microsoft.com/office/powerpoint/2010/main" val="363637892"/>
+        <p14:creationId xmlns:p14="http://schemas.microsoft.com/office/powerpoint/2010/main" xmlns="" val="363637892"/>
       </p:ext>
     </p:extLst>
   </p:cSld>
@@ -4378,22 +4404,15 @@
             <p:ph type="title"/>
           </p:nvPr>
         </p:nvSpPr>
-        <p:spPr>
-          <a:xfrm>
-            <a:off x="467544" y="836712"/>
-            <a:ext cx="8229600" cy="792088"/>
-          </a:xfrm>
-        </p:spPr>
-        <p:txBody>
-          <a:bodyPr>
-            <a:normAutofit fontScale="90000"/>
-          </a:bodyPr>
+        <p:spPr/>
+        <p:txBody>
+          <a:bodyPr/>
           <a:lstStyle/>
           <a:p>
             <a:pPr algn="ctr"/>
             <a:r>
               <a:rPr lang="es-ES" dirty="0" smtClean="0"/>
-              <a:t>Inspector - Variables</a:t>
+              <a:t>Tracer</a:t>
             </a:r>
             <a:endParaRPr lang="es-ES" dirty="0"/>
           </a:p>
@@ -4401,62 +4420,423 @@
       </p:sp>
       <p:pic>
         <p:nvPicPr>
-          <p:cNvPr id="2051" name="Picture 3"/>
+          <p:cNvPr id="6146" name="Picture 2" descr="C:\Users\Saskya\Desktop\XML-icon.png"/>
           <p:cNvPicPr>
-            <a:picLocks noGrp="1" noChangeAspect="1" noChangeArrowheads="1"/>
+            <a:picLocks noChangeAspect="1" noChangeArrowheads="1"/>
           </p:cNvPicPr>
-          <p:nvPr>
-            <p:ph idx="1"/>
-          </p:nvPr>
+          <p:nvPr/>
         </p:nvPicPr>
-        <p:blipFill rotWithShape="1">
+        <p:blipFill>
           <a:blip r:embed="rId2">
             <a:extLst>
               <a:ext uri="{28A0092B-C50C-407E-A947-70E740481C1C}">
-                <a14:useLocalDpi xmlns:a14="http://schemas.microsoft.com/office/drawing/2010/main" val="0"/>
+                <a14:useLocalDpi xmlns:a14="http://schemas.microsoft.com/office/drawing/2010/main" xmlns="" val="0"/>
               </a:ext>
             </a:extLst>
           </a:blip>
-          <a:srcRect l="70303" t="5415" b="53541"/>
-          <a:stretch/>
+          <a:srcRect/>
+          <a:stretch>
+            <a:fillRect/>
+          </a:stretch>
         </p:blipFill>
         <p:spPr bwMode="auto">
           <a:xfrm>
-            <a:off x="2339752" y="2132856"/>
-            <a:ext cx="4816267" cy="3744416"/>
+            <a:off x="7596336" y="3350185"/>
+            <a:ext cx="1358280" cy="1358280"/>
           </a:xfrm>
           <a:prstGeom prst="rect">
             <a:avLst/>
           </a:prstGeom>
           <a:noFill/>
-          <a:ln>
-            <a:noFill/>
-          </a:ln>
           <a:extLst>
             <a:ext uri="{909E8E84-426E-40DD-AFC4-6F175D3DCCD1}">
-              <a14:hiddenFill xmlns:a14="http://schemas.microsoft.com/office/drawing/2010/main">
+              <a14:hiddenFill xmlns:a14="http://schemas.microsoft.com/office/drawing/2010/main" xmlns="">
                 <a:solidFill>
-                  <a:schemeClr val="accent1"/>
+                  <a:srgbClr val="FFFFFF"/>
                 </a:solidFill>
               </a14:hiddenFill>
-            </a:ext>
-            <a:ext uri="{91240B29-F687-4F45-9708-019B960494DF}">
-              <a14:hiddenLine xmlns:a14="http://schemas.microsoft.com/office/drawing/2010/main" w="9525">
-                <a:solidFill>
-                  <a:schemeClr val="tx1"/>
-                </a:solidFill>
-                <a:miter lim="800000"/>
-                <a:headEnd/>
-                <a:tailEnd/>
-              </a14:hiddenLine>
             </a:ext>
           </a:extLst>
         </p:spPr>
       </p:pic>
+      <p:pic>
+        <p:nvPicPr>
+          <p:cNvPr id="6147" name="Picture 3" descr="C:\Users\Saskya\Desktop\descarga.jpe"/>
+          <p:cNvPicPr>
+            <a:picLocks noChangeAspect="1" noChangeArrowheads="1"/>
+          </p:cNvPicPr>
+          <p:nvPr/>
+        </p:nvPicPr>
+        <p:blipFill>
+          <a:blip r:embed="rId3">
+            <a:extLst>
+              <a:ext uri="{28A0092B-C50C-407E-A947-70E740481C1C}">
+                <a14:useLocalDpi xmlns:a14="http://schemas.microsoft.com/office/drawing/2010/main" xmlns="" val="0"/>
+              </a:ext>
+            </a:extLst>
+          </a:blip>
+          <a:srcRect/>
+          <a:stretch>
+            <a:fillRect/>
+          </a:stretch>
+        </p:blipFill>
+        <p:spPr bwMode="auto">
+          <a:xfrm>
+            <a:off x="619956" y="4491845"/>
+            <a:ext cx="1008112" cy="1008112"/>
+          </a:xfrm>
+          <a:prstGeom prst="rect">
+            <a:avLst/>
+          </a:prstGeom>
+          <a:noFill/>
+          <a:extLst>
+            <a:ext uri="{909E8E84-426E-40DD-AFC4-6F175D3DCCD1}">
+              <a14:hiddenFill xmlns:a14="http://schemas.microsoft.com/office/drawing/2010/main" xmlns="">
+                <a:solidFill>
+                  <a:srgbClr val="FFFFFF"/>
+                </a:solidFill>
+              </a14:hiddenFill>
+            </a:ext>
+          </a:extLst>
+        </p:spPr>
+      </p:pic>
+      <p:pic>
+        <p:nvPicPr>
+          <p:cNvPr id="6148" name="Picture 4" descr="C:\Users\Saskya\Desktop\class_file_java.png"/>
+          <p:cNvPicPr>
+            <a:picLocks noGrp="1" noChangeAspect="1" noChangeArrowheads="1"/>
+          </p:cNvPicPr>
+          <p:nvPr>
+            <p:ph idx="1"/>
+          </p:nvPr>
+        </p:nvPicPr>
+        <p:blipFill>
+          <a:blip r:embed="rId4">
+            <a:extLst>
+              <a:ext uri="{28A0092B-C50C-407E-A947-70E740481C1C}">
+                <a14:useLocalDpi xmlns:a14="http://schemas.microsoft.com/office/drawing/2010/main" xmlns="" val="0"/>
+              </a:ext>
+            </a:extLst>
+          </a:blip>
+          <a:srcRect/>
+          <a:stretch>
+            <a:fillRect/>
+          </a:stretch>
+        </p:blipFill>
+        <p:spPr bwMode="auto">
+          <a:xfrm>
+            <a:off x="485156" y="2435823"/>
+            <a:ext cx="1238042" cy="1238042"/>
+          </a:xfrm>
+          <a:prstGeom prst="rect">
+            <a:avLst/>
+          </a:prstGeom>
+          <a:noFill/>
+          <a:extLst>
+            <a:ext uri="{909E8E84-426E-40DD-AFC4-6F175D3DCCD1}">
+              <a14:hiddenFill xmlns:a14="http://schemas.microsoft.com/office/drawing/2010/main" xmlns="">
+                <a:solidFill>
+                  <a:srgbClr val="FFFFFF"/>
+                </a:solidFill>
+              </a14:hiddenFill>
+            </a:ext>
+          </a:extLst>
+        </p:spPr>
+      </p:pic>
+      <p:sp>
+        <p:nvSpPr>
+          <p:cNvPr id="5" name="4 CuadroTexto"/>
+          <p:cNvSpPr txBox="1"/>
+          <p:nvPr/>
+        </p:nvSpPr>
+        <p:spPr>
+          <a:xfrm>
+            <a:off x="4119942" y="3770821"/>
+            <a:ext cx="1846468" cy="584775"/>
+          </a:xfrm>
+          <a:prstGeom prst="rect">
+            <a:avLst/>
+          </a:prstGeom>
+        </p:spPr>
+        <p:style>
+          <a:lnRef idx="1">
+            <a:schemeClr val="dk1"/>
+          </a:lnRef>
+          <a:fillRef idx="1002">
+            <a:schemeClr val="dk2"/>
+          </a:fillRef>
+          <a:effectRef idx="1">
+            <a:schemeClr val="dk1"/>
+          </a:effectRef>
+          <a:fontRef idx="minor">
+            <a:schemeClr val="dk1"/>
+          </a:fontRef>
+        </p:style>
+        <p:txBody>
+          <a:bodyPr wrap="square" rtlCol="0">
+            <a:spAutoFit/>
+          </a:bodyPr>
+          <a:lstStyle/>
+          <a:p>
+            <a:r>
+              <a:rPr lang="es-ES" sz="2800" dirty="0" smtClean="0"/>
+              <a:t> </a:t>
+            </a:r>
+            <a:r>
+              <a:rPr lang="es-ES" sz="3200" dirty="0" smtClean="0">
+                <a:solidFill>
+                  <a:schemeClr val="bg1"/>
+                </a:solidFill>
+                <a:effectLst>
+                  <a:outerShdw blurRad="38100" dist="38100" dir="2700000" algn="tl">
+                    <a:srgbClr val="000000">
+                      <a:alpha val="43137"/>
+                    </a:srgbClr>
+                  </a:outerShdw>
+                </a:effectLst>
+              </a:rPr>
+              <a:t>TRACER</a:t>
+            </a:r>
+            <a:endParaRPr lang="es-ES" sz="3200" dirty="0">
+              <a:solidFill>
+                <a:schemeClr val="bg1"/>
+              </a:solidFill>
+              <a:effectLst>
+                <a:outerShdw blurRad="38100" dist="38100" dir="2700000" algn="tl">
+                  <a:srgbClr val="000000">
+                    <a:alpha val="43137"/>
+                  </a:srgbClr>
+                </a:outerShdw>
+              </a:effectLst>
+            </a:endParaRPr>
+          </a:p>
+        </p:txBody>
+      </p:sp>
+      <p:sp>
+        <p:nvSpPr>
+          <p:cNvPr id="6" name="5 CuadroTexto"/>
+          <p:cNvSpPr txBox="1"/>
+          <p:nvPr/>
+        </p:nvSpPr>
+        <p:spPr>
+          <a:xfrm>
+            <a:off x="477104" y="3568017"/>
+            <a:ext cx="1804405" cy="430887"/>
+          </a:xfrm>
+          <a:prstGeom prst="rect">
+            <a:avLst/>
+          </a:prstGeom>
+          <a:noFill/>
+        </p:spPr>
+        <p:txBody>
+          <a:bodyPr wrap="none" rtlCol="0">
+            <a:spAutoFit/>
+          </a:bodyPr>
+          <a:lstStyle/>
+          <a:p>
+            <a:r>
+              <a:rPr lang="es-ES" sz="2200" dirty="0" smtClean="0">
+                <a:effectLst>
+                  <a:outerShdw blurRad="38100" dist="38100" dir="2700000" algn="tl">
+                    <a:srgbClr val="000000">
+                      <a:alpha val="43137"/>
+                    </a:srgbClr>
+                  </a:outerShdw>
+                </a:effectLst>
+              </a:rPr>
+              <a:t>Fichero .class</a:t>
+            </a:r>
+            <a:endParaRPr lang="es-ES" sz="2200" dirty="0">
+              <a:effectLst>
+                <a:outerShdw blurRad="38100" dist="38100" dir="2700000" algn="tl">
+                  <a:srgbClr val="000000">
+                    <a:alpha val="43137"/>
+                  </a:srgbClr>
+                </a:outerShdw>
+              </a:effectLst>
+            </a:endParaRPr>
+          </a:p>
+        </p:txBody>
+      </p:sp>
+      <p:sp>
+        <p:nvSpPr>
+          <p:cNvPr id="7" name="6 CuadroTexto"/>
+          <p:cNvSpPr txBox="1"/>
+          <p:nvPr/>
+        </p:nvSpPr>
+        <p:spPr>
+          <a:xfrm>
+            <a:off x="536989" y="5733256"/>
+            <a:ext cx="2954891" cy="430887"/>
+          </a:xfrm>
+          <a:prstGeom prst="rect">
+            <a:avLst/>
+          </a:prstGeom>
+          <a:noFill/>
+        </p:spPr>
+        <p:txBody>
+          <a:bodyPr wrap="square" rtlCol="0">
+            <a:spAutoFit/>
+          </a:bodyPr>
+          <a:lstStyle/>
+          <a:p>
+            <a:r>
+              <a:rPr lang="es-ES" sz="2200" dirty="0" smtClean="0">
+                <a:effectLst>
+                  <a:outerShdw blurRad="38100" dist="38100" dir="2700000" algn="tl">
+                    <a:srgbClr val="000000">
+                      <a:alpha val="43137"/>
+                    </a:srgbClr>
+                  </a:outerShdw>
+                </a:effectLst>
+              </a:rPr>
+              <a:t>Fichero .jar ejecutable</a:t>
+            </a:r>
+            <a:endParaRPr lang="es-ES" sz="2200" dirty="0">
+              <a:effectLst>
+                <a:outerShdw blurRad="38100" dist="38100" dir="2700000" algn="tl">
+                  <a:srgbClr val="000000">
+                    <a:alpha val="43137"/>
+                  </a:srgbClr>
+                </a:outerShdw>
+              </a:effectLst>
+            </a:endParaRPr>
+          </a:p>
+        </p:txBody>
+      </p:sp>
+      <p:sp>
+        <p:nvSpPr>
+          <p:cNvPr id="12" name="11 Flecha derecha"/>
+          <p:cNvSpPr/>
+          <p:nvPr/>
+        </p:nvSpPr>
+        <p:spPr>
+          <a:xfrm>
+            <a:off x="6125294" y="3792277"/>
+            <a:ext cx="1440160" cy="575774"/>
+          </a:xfrm>
+          <a:prstGeom prst="rightArrow">
+            <a:avLst/>
+          </a:prstGeom>
+        </p:spPr>
+        <p:style>
+          <a:lnRef idx="2">
+            <a:schemeClr val="accent1">
+              <a:shade val="50000"/>
+            </a:schemeClr>
+          </a:lnRef>
+          <a:fillRef idx="1">
+            <a:schemeClr val="accent1"/>
+          </a:fillRef>
+          <a:effectRef idx="0">
+            <a:schemeClr val="accent1"/>
+          </a:effectRef>
+          <a:fontRef idx="minor">
+            <a:schemeClr val="lt1"/>
+          </a:fontRef>
+        </p:style>
+        <p:txBody>
+          <a:bodyPr rtlCol="0" anchor="ctr"/>
+          <a:lstStyle/>
+          <a:p>
+            <a:pPr algn="ctr"/>
+            <a:endParaRPr lang="es-ES"/>
+          </a:p>
+        </p:txBody>
+      </p:sp>
+      <p:sp>
+        <p:nvSpPr>
+          <p:cNvPr id="19" name="18 Flecha derecha"/>
+          <p:cNvSpPr/>
+          <p:nvPr/>
+        </p:nvSpPr>
+        <p:spPr>
+          <a:xfrm rot="1448374">
+            <a:off x="1936775" y="3134161"/>
+            <a:ext cx="2035937" cy="432048"/>
+          </a:xfrm>
+          <a:prstGeom prst="rightArrow">
+            <a:avLst>
+              <a:gd name="adj1" fmla="val 50000"/>
+              <a:gd name="adj2" fmla="val 52800"/>
+            </a:avLst>
+          </a:prstGeom>
+        </p:spPr>
+        <p:style>
+          <a:lnRef idx="2">
+            <a:schemeClr val="accent1">
+              <a:shade val="50000"/>
+            </a:schemeClr>
+          </a:lnRef>
+          <a:fillRef idx="1">
+            <a:schemeClr val="accent1"/>
+          </a:fillRef>
+          <a:effectRef idx="0">
+            <a:schemeClr val="accent1"/>
+          </a:effectRef>
+          <a:fontRef idx="minor">
+            <a:schemeClr val="lt1"/>
+          </a:fontRef>
+        </p:style>
+        <p:txBody>
+          <a:bodyPr rtlCol="0" anchor="ctr"/>
+          <a:lstStyle/>
+          <a:p>
+            <a:pPr algn="ctr"/>
+            <a:endParaRPr lang="es-ES"/>
+          </a:p>
+        </p:txBody>
+      </p:sp>
+      <p:sp>
+        <p:nvSpPr>
+          <p:cNvPr id="20" name="19 Flecha derecha"/>
+          <p:cNvSpPr/>
+          <p:nvPr/>
+        </p:nvSpPr>
+        <p:spPr>
+          <a:xfrm rot="20151626" flipV="1">
+            <a:off x="1936774" y="4513444"/>
+            <a:ext cx="2035937" cy="432048"/>
+          </a:xfrm>
+          <a:prstGeom prst="rightArrow">
+            <a:avLst>
+              <a:gd name="adj1" fmla="val 50000"/>
+              <a:gd name="adj2" fmla="val 52800"/>
+            </a:avLst>
+          </a:prstGeom>
+          <a:effectLst>
+            <a:reflection endPos="0" dist="50800" dir="5400000" sy="-100000" algn="bl" rotWithShape="0"/>
+          </a:effectLst>
+        </p:spPr>
+        <p:style>
+          <a:lnRef idx="2">
+            <a:schemeClr val="accent1">
+              <a:shade val="50000"/>
+            </a:schemeClr>
+          </a:lnRef>
+          <a:fillRef idx="1">
+            <a:schemeClr val="accent1"/>
+          </a:fillRef>
+          <a:effectRef idx="0">
+            <a:schemeClr val="accent1"/>
+          </a:effectRef>
+          <a:fontRef idx="minor">
+            <a:schemeClr val="lt1"/>
+          </a:fontRef>
+        </p:style>
+        <p:txBody>
+          <a:bodyPr rtlCol="0" anchor="ctr"/>
+          <a:lstStyle/>
+          <a:p>
+            <a:pPr algn="ctr"/>
+            <a:endParaRPr lang="es-ES"/>
+          </a:p>
+        </p:txBody>
+      </p:sp>
     </p:spTree>
     <p:extLst>
       <p:ext uri="{BB962C8B-B14F-4D97-AF65-F5344CB8AC3E}">
-        <p14:creationId xmlns:p14="http://schemas.microsoft.com/office/powerpoint/2010/main" val="3465291779"/>
+        <p14:creationId xmlns:p14="http://schemas.microsoft.com/office/powerpoint/2010/main" xmlns="" val="4196290447"/>
       </p:ext>
     </p:extLst>
   </p:cSld>
@@ -4502,8 +4882,8 @@
         </p:nvSpPr>
         <p:spPr>
           <a:xfrm>
-            <a:off x="467544" y="836712"/>
-            <a:ext cx="8229600" cy="720080"/>
+            <a:off x="521136" y="980728"/>
+            <a:ext cx="8229600" cy="576064"/>
           </a:xfrm>
         </p:spPr>
         <p:txBody>
@@ -4515,27 +4895,44 @@
             <a:pPr algn="ctr"/>
             <a:r>
               <a:rPr lang="es-ES" dirty="0" smtClean="0"/>
-              <a:t>Profiler</a:t>
+              <a:t>Inspector</a:t>
             </a:r>
             <a:endParaRPr lang="es-ES" dirty="0"/>
+          </a:p>
+        </p:txBody>
+      </p:sp>
+      <p:sp>
+        <p:nvSpPr>
+          <p:cNvPr id="3" name="2 Marcador de contenido"/>
+          <p:cNvSpPr>
+            <a:spLocks noGrp="1"/>
+          </p:cNvSpPr>
+          <p:nvPr>
+            <p:ph idx="1"/>
+          </p:nvPr>
+        </p:nvSpPr>
+        <p:spPr/>
+        <p:txBody>
+          <a:bodyPr/>
+          <a:lstStyle/>
+          <a:p>
+            <a:endParaRPr lang="es-ES" u="sng" dirty="0"/>
           </a:p>
         </p:txBody>
       </p:sp>
       <p:pic>
         <p:nvPicPr>
-          <p:cNvPr id="10242" name="Picture 2"/>
+          <p:cNvPr id="7171" name="Picture 3"/>
           <p:cNvPicPr>
-            <a:picLocks noGrp="1" noChangeAspect="1" noChangeArrowheads="1"/>
+            <a:picLocks noChangeAspect="1" noChangeArrowheads="1"/>
           </p:cNvPicPr>
-          <p:nvPr>
-            <p:ph idx="1"/>
-          </p:nvPr>
+          <p:nvPr/>
         </p:nvPicPr>
         <p:blipFill>
           <a:blip r:embed="rId2">
             <a:extLst>
               <a:ext uri="{28A0092B-C50C-407E-A947-70E740481C1C}">
-                <a14:useLocalDpi xmlns:a14="http://schemas.microsoft.com/office/drawing/2010/main" val="0"/>
+                <a14:useLocalDpi xmlns:a14="http://schemas.microsoft.com/office/drawing/2010/main" xmlns="" val="0"/>
               </a:ext>
             </a:extLst>
           </a:blip>
@@ -4546,8 +4943,8 @@
         </p:blipFill>
         <p:spPr bwMode="auto">
           <a:xfrm>
-            <a:off x="611560" y="1916832"/>
-            <a:ext cx="8142108" cy="4389437"/>
+            <a:off x="253792" y="1988840"/>
+            <a:ext cx="8496944" cy="4468408"/>
           </a:xfrm>
           <a:prstGeom prst="rect">
             <a:avLst/>
@@ -4558,14 +4955,14 @@
           </a:ln>
           <a:extLst>
             <a:ext uri="{909E8E84-426E-40DD-AFC4-6F175D3DCCD1}">
-              <a14:hiddenFill xmlns:a14="http://schemas.microsoft.com/office/drawing/2010/main">
+              <a14:hiddenFill xmlns:a14="http://schemas.microsoft.com/office/drawing/2010/main" xmlns="">
                 <a:solidFill>
                   <a:schemeClr val="accent1"/>
                 </a:solidFill>
               </a14:hiddenFill>
             </a:ext>
             <a:ext uri="{91240B29-F687-4F45-9708-019B960494DF}">
-              <a14:hiddenLine xmlns:a14="http://schemas.microsoft.com/office/drawing/2010/main" w="9525">
+              <a14:hiddenLine xmlns:a14="http://schemas.microsoft.com/office/drawing/2010/main" xmlns="" w="9525">
                 <a:solidFill>
                   <a:schemeClr val="tx1"/>
                 </a:solidFill>
@@ -4580,7 +4977,7 @@
     </p:spTree>
     <p:extLst>
       <p:ext uri="{BB962C8B-B14F-4D97-AF65-F5344CB8AC3E}">
-        <p14:creationId xmlns:p14="http://schemas.microsoft.com/office/powerpoint/2010/main" val="3903137001"/>
+        <p14:creationId xmlns:p14="http://schemas.microsoft.com/office/powerpoint/2010/main" xmlns="" val="13191627"/>
       </p:ext>
     </p:extLst>
   </p:cSld>
@@ -4624,12 +5021,7 @@
             <p:ph type="title"/>
           </p:nvPr>
         </p:nvSpPr>
-        <p:spPr>
-          <a:xfrm>
-            <a:off x="457200" y="704088"/>
-            <a:ext cx="8229600" cy="852704"/>
-          </a:xfrm>
-        </p:spPr>
+        <p:spPr/>
         <p:txBody>
           <a:bodyPr/>
           <a:lstStyle/>
@@ -4637,7 +5029,7 @@
             <a:pPr algn="ctr"/>
             <a:r>
               <a:rPr lang="es-ES" dirty="0" smtClean="0"/>
-              <a:t>Profiler - Estadísticas</a:t>
+              <a:t>Inspector - Árbol de llamadas</a:t>
             </a:r>
             <a:endParaRPr lang="es-ES" dirty="0"/>
           </a:p>
@@ -4645,7 +5037,7 @@
       </p:sp>
       <p:pic>
         <p:nvPicPr>
-          <p:cNvPr id="11266" name="Picture 2"/>
+          <p:cNvPr id="5" name="Picture 4"/>
           <p:cNvPicPr>
             <a:picLocks noGrp="1" noChangeAspect="1" noChangeArrowheads="1"/>
           </p:cNvPicPr>
@@ -4653,23 +5045,21 @@
             <p:ph idx="1"/>
           </p:nvPr>
         </p:nvPicPr>
-        <p:blipFill>
+        <p:blipFill rotWithShape="1">
           <a:blip r:embed="rId2">
             <a:extLst>
               <a:ext uri="{28A0092B-C50C-407E-A947-70E740481C1C}">
-                <a14:useLocalDpi xmlns:a14="http://schemas.microsoft.com/office/drawing/2010/main" val="0"/>
+                <a14:useLocalDpi xmlns:a14="http://schemas.microsoft.com/office/drawing/2010/main" xmlns="" val="0"/>
               </a:ext>
             </a:extLst>
           </a:blip>
-          <a:srcRect/>
-          <a:stretch>
-            <a:fillRect/>
-          </a:stretch>
+          <a:srcRect l="8891" r="4558"/>
+          <a:stretch/>
         </p:blipFill>
         <p:spPr bwMode="auto">
           <a:xfrm>
-            <a:off x="1619672" y="1772816"/>
-            <a:ext cx="5947714" cy="4821520"/>
+            <a:off x="467544" y="2636912"/>
+            <a:ext cx="7977876" cy="3176542"/>
           </a:xfrm>
           <a:prstGeom prst="rect">
             <a:avLst/>
@@ -4680,14 +5070,14 @@
           </a:ln>
           <a:extLst>
             <a:ext uri="{909E8E84-426E-40DD-AFC4-6F175D3DCCD1}">
-              <a14:hiddenFill xmlns:a14="http://schemas.microsoft.com/office/drawing/2010/main">
+              <a14:hiddenFill xmlns:a14="http://schemas.microsoft.com/office/drawing/2010/main" xmlns="">
                 <a:solidFill>
                   <a:schemeClr val="accent1"/>
                 </a:solidFill>
               </a14:hiddenFill>
             </a:ext>
             <a:ext uri="{91240B29-F687-4F45-9708-019B960494DF}">
-              <a14:hiddenLine xmlns:a14="http://schemas.microsoft.com/office/drawing/2010/main" w="9525">
+              <a14:hiddenLine xmlns:a14="http://schemas.microsoft.com/office/drawing/2010/main" xmlns="" w="9525">
                 <a:solidFill>
                   <a:schemeClr val="tx1"/>
                 </a:solidFill>
@@ -4702,7 +5092,7 @@
     </p:spTree>
     <p:extLst>
       <p:ext uri="{BB962C8B-B14F-4D97-AF65-F5344CB8AC3E}">
-        <p14:creationId xmlns:p14="http://schemas.microsoft.com/office/powerpoint/2010/main" val="3048006607"/>
+        <p14:creationId xmlns:p14="http://schemas.microsoft.com/office/powerpoint/2010/main" xmlns="" val="967793235"/>
       </p:ext>
     </p:extLst>
   </p:cSld>
@@ -4748,18 +5138,20 @@
         </p:nvSpPr>
         <p:spPr>
           <a:xfrm>
-            <a:off x="457200" y="704088"/>
-            <a:ext cx="8229600" cy="996720"/>
+            <a:off x="467544" y="836712"/>
+            <a:ext cx="8229600" cy="792088"/>
           </a:xfrm>
         </p:spPr>
         <p:txBody>
-          <a:bodyPr/>
+          <a:bodyPr>
+            <a:normAutofit fontScale="90000"/>
+          </a:bodyPr>
           <a:lstStyle/>
           <a:p>
             <a:pPr algn="ctr"/>
             <a:r>
               <a:rPr lang="es-ES" dirty="0" smtClean="0"/>
-              <a:t>Profiler – Datos  </a:t>
+              <a:t>Inspector - Variables</a:t>
             </a:r>
             <a:endParaRPr lang="es-ES" dirty="0"/>
           </a:p>
@@ -4767,7 +5159,7 @@
       </p:sp>
       <p:pic>
         <p:nvPicPr>
-          <p:cNvPr id="7" name="Picture 4" descr="C:\Users\Saskya\Desktop\Sin título2.png"/>
+          <p:cNvPr id="2051" name="Picture 3"/>
           <p:cNvPicPr>
             <a:picLocks noGrp="1" noChangeAspect="1" noChangeArrowheads="1"/>
           </p:cNvPicPr>
@@ -4779,29 +5171,42 @@
           <a:blip r:embed="rId2">
             <a:extLst>
               <a:ext uri="{28A0092B-C50C-407E-A947-70E740481C1C}">
-                <a14:useLocalDpi xmlns:a14="http://schemas.microsoft.com/office/drawing/2010/main" val="0"/>
+                <a14:useLocalDpi xmlns:a14="http://schemas.microsoft.com/office/drawing/2010/main" xmlns="" val="0"/>
               </a:ext>
             </a:extLst>
           </a:blip>
-          <a:srcRect b="36106"/>
+          <a:srcRect l="70303" t="5415" b="53541"/>
           <a:stretch/>
         </p:blipFill>
         <p:spPr bwMode="auto">
           <a:xfrm>
-            <a:off x="827584" y="1844824"/>
-            <a:ext cx="7539494" cy="4248472"/>
+            <a:off x="2339752" y="2132856"/>
+            <a:ext cx="4816267" cy="3744416"/>
           </a:xfrm>
           <a:prstGeom prst="rect">
             <a:avLst/>
           </a:prstGeom>
           <a:noFill/>
+          <a:ln>
+            <a:noFill/>
+          </a:ln>
           <a:extLst>
             <a:ext uri="{909E8E84-426E-40DD-AFC4-6F175D3DCCD1}">
-              <a14:hiddenFill xmlns:a14="http://schemas.microsoft.com/office/drawing/2010/main">
+              <a14:hiddenFill xmlns:a14="http://schemas.microsoft.com/office/drawing/2010/main" xmlns="">
                 <a:solidFill>
-                  <a:srgbClr val="FFFFFF"/>
+                  <a:schemeClr val="accent1"/>
                 </a:solidFill>
               </a14:hiddenFill>
+            </a:ext>
+            <a:ext uri="{91240B29-F687-4F45-9708-019B960494DF}">
+              <a14:hiddenLine xmlns:a14="http://schemas.microsoft.com/office/drawing/2010/main" xmlns="" w="9525">
+                <a:solidFill>
+                  <a:schemeClr val="tx1"/>
+                </a:solidFill>
+                <a:miter lim="800000"/>
+                <a:headEnd/>
+                <a:tailEnd/>
+              </a14:hiddenLine>
             </a:ext>
           </a:extLst>
         </p:spPr>
@@ -4809,7 +5214,7 @@
     </p:spTree>
     <p:extLst>
       <p:ext uri="{BB962C8B-B14F-4D97-AF65-F5344CB8AC3E}">
-        <p14:creationId xmlns:p14="http://schemas.microsoft.com/office/powerpoint/2010/main" val="3322359645"/>
+        <p14:creationId xmlns:p14="http://schemas.microsoft.com/office/powerpoint/2010/main" xmlns="" val="3465291779"/>
       </p:ext>
     </p:extLst>
   </p:cSld>
@@ -4898,22 +5303,14 @@
           <a:p>
             <a:r>
               <a:rPr lang="es-ES" dirty="0" smtClean="0"/>
-              <a:t>Durante </a:t>
-            </a:r>
+              <a:t>Durante el desarrollo surgieron diversos problemas:</a:t>
+            </a:r>
+          </a:p>
+          <a:p>
+            <a:pPr lvl="1"/>
             <a:r>
               <a:rPr lang="es-ES" dirty="0" smtClean="0"/>
-              <a:t>el desarrollo surgieron diversos problemas:</a:t>
-            </a:r>
-          </a:p>
-          <a:p>
-            <a:pPr lvl="1"/>
-            <a:r>
-              <a:rPr lang="es-ES" dirty="0" smtClean="0"/>
-              <a:t>Tamaño </a:t>
-            </a:r>
-            <a:r>
-              <a:rPr lang="es-ES" dirty="0" smtClean="0"/>
-              <a:t>de la traza.</a:t>
+              <a:t>Tamaño de la traza.</a:t>
             </a:r>
           </a:p>
           <a:p>
@@ -4931,7 +5328,7 @@
     </p:spTree>
     <p:extLst>
       <p:ext uri="{BB962C8B-B14F-4D97-AF65-F5344CB8AC3E}">
-        <p14:creationId xmlns:p14="http://schemas.microsoft.com/office/powerpoint/2010/main" val="2227166397"/>
+        <p14:creationId xmlns:p14="http://schemas.microsoft.com/office/powerpoint/2010/main" xmlns="" val="2227166397"/>
       </p:ext>
     </p:extLst>
   </p:cSld>
@@ -5230,7 +5627,7 @@
     </p:spTree>
     <p:extLst>
       <p:ext uri="{BB962C8B-B14F-4D97-AF65-F5344CB8AC3E}">
-        <p14:creationId xmlns:p14="http://schemas.microsoft.com/office/powerpoint/2010/main" val="50459226"/>
+        <p14:creationId xmlns:p14="http://schemas.microsoft.com/office/powerpoint/2010/main" xmlns="" val="50459226"/>
       </p:ext>
     </p:extLst>
   </p:cSld>
@@ -5579,7 +5976,7 @@
           <a:blip r:embed="rId2">
             <a:extLst>
               <a:ext uri="{28A0092B-C50C-407E-A947-70E740481C1C}">
-                <a14:useLocalDpi xmlns:a14="http://schemas.microsoft.com/office/drawing/2010/main" val="0"/>
+                <a14:useLocalDpi xmlns:a14="http://schemas.microsoft.com/office/drawing/2010/main" xmlns="" val="0"/>
               </a:ext>
             </a:extLst>
           </a:blip>
@@ -5602,14 +5999,14 @@
           </a:ln>
           <a:extLst>
             <a:ext uri="{909E8E84-426E-40DD-AFC4-6F175D3DCCD1}">
-              <a14:hiddenFill xmlns:a14="http://schemas.microsoft.com/office/drawing/2010/main">
+              <a14:hiddenFill xmlns:a14="http://schemas.microsoft.com/office/drawing/2010/main" xmlns="">
                 <a:solidFill>
                   <a:schemeClr val="accent1"/>
                 </a:solidFill>
               </a14:hiddenFill>
             </a:ext>
             <a:ext uri="{91240B29-F687-4F45-9708-019B960494DF}">
-              <a14:hiddenLine xmlns:a14="http://schemas.microsoft.com/office/drawing/2010/main" w="9525">
+              <a14:hiddenLine xmlns:a14="http://schemas.microsoft.com/office/drawing/2010/main" xmlns="" w="9525">
                 <a:solidFill>
                   <a:schemeClr val="tx1"/>
                 </a:solidFill>
@@ -5624,7 +6021,7 @@
     </p:spTree>
     <p:extLst>
       <p:ext uri="{BB962C8B-B14F-4D97-AF65-F5344CB8AC3E}">
-        <p14:creationId xmlns:p14="http://schemas.microsoft.com/office/powerpoint/2010/main" val="4088659240"/>
+        <p14:creationId xmlns:p14="http://schemas.microsoft.com/office/powerpoint/2010/main" xmlns="" val="4088659240"/>
       </p:ext>
     </p:extLst>
   </p:cSld>
@@ -5976,19 +6373,7 @@
             <a:pPr lvl="1"/>
             <a:r>
               <a:rPr lang="es-ES" dirty="0" smtClean="0"/>
-              <a:t>Para programas </a:t>
-            </a:r>
-            <a:r>
-              <a:rPr lang="es-ES" dirty="0" smtClean="0"/>
-              <a:t>que generan trazas excesivamente</a:t>
-            </a:r>
-            <a:r>
-              <a:rPr lang="es-ES" dirty="0" smtClean="0"/>
-              <a:t> grandes </a:t>
-            </a:r>
-            <a:r>
-              <a:rPr lang="es-ES" dirty="0" smtClean="0"/>
-              <a:t>se podría utilizar BigData como método de almacenamiento. </a:t>
+              <a:t>Para programas que generan trazas excesivamente grandes se podría utilizar BigData como método de almacenamiento. </a:t>
             </a:r>
             <a:endParaRPr lang="es-ES" dirty="0"/>
           </a:p>
@@ -6038,7 +6423,7 @@
     </p:spTree>
     <p:extLst>
       <p:ext uri="{BB962C8B-B14F-4D97-AF65-F5344CB8AC3E}">
-        <p14:creationId xmlns:p14="http://schemas.microsoft.com/office/powerpoint/2010/main" val="2016262835"/>
+        <p14:creationId xmlns:p14="http://schemas.microsoft.com/office/powerpoint/2010/main" xmlns="" val="2016262835"/>
       </p:ext>
     </p:extLst>
   </p:cSld>
@@ -6399,7 +6784,7 @@
           <a:blip r:embed="rId2">
             <a:extLst>
               <a:ext uri="{28A0092B-C50C-407E-A947-70E740481C1C}">
-                <a14:useLocalDpi xmlns:a14="http://schemas.microsoft.com/office/drawing/2010/main" val="0"/>
+                <a14:useLocalDpi xmlns:a14="http://schemas.microsoft.com/office/drawing/2010/main" xmlns="" val="0"/>
               </a:ext>
             </a:extLst>
           </a:blip>
@@ -6419,7 +6804,7 @@
           <a:noFill/>
           <a:extLst>
             <a:ext uri="{909E8E84-426E-40DD-AFC4-6F175D3DCCD1}">
-              <a14:hiddenFill xmlns:a14="http://schemas.microsoft.com/office/drawing/2010/main">
+              <a14:hiddenFill xmlns:a14="http://schemas.microsoft.com/office/drawing/2010/main" xmlns="">
                 <a:solidFill>
                   <a:srgbClr val="FFFFFF"/>
                 </a:solidFill>
@@ -6431,7 +6816,7 @@
     </p:spTree>
     <p:extLst>
       <p:ext uri="{BB962C8B-B14F-4D97-AF65-F5344CB8AC3E}">
-        <p14:creationId xmlns:p14="http://schemas.microsoft.com/office/powerpoint/2010/main" val="2318250775"/>
+        <p14:creationId xmlns:p14="http://schemas.microsoft.com/office/powerpoint/2010/main" xmlns="" val="2318250775"/>
       </p:ext>
     </p:extLst>
   </p:cSld>
@@ -6503,7 +6888,7 @@
           <a:blip r:embed="rId2">
             <a:extLst>
               <a:ext uri="{28A0092B-C50C-407E-A947-70E740481C1C}">
-                <a14:useLocalDpi xmlns:a14="http://schemas.microsoft.com/office/drawing/2010/main" val="0"/>
+                <a14:useLocalDpi xmlns:a14="http://schemas.microsoft.com/office/drawing/2010/main" xmlns="" val="0"/>
               </a:ext>
             </a:extLst>
           </a:blip>
@@ -6523,7 +6908,7 @@
           <a:noFill/>
           <a:extLst>
             <a:ext uri="{909E8E84-426E-40DD-AFC4-6F175D3DCCD1}">
-              <a14:hiddenFill xmlns:a14="http://schemas.microsoft.com/office/drawing/2010/main">
+              <a14:hiddenFill xmlns:a14="http://schemas.microsoft.com/office/drawing/2010/main" xmlns="">
                 <a:solidFill>
                   <a:srgbClr val="FFFFFF"/>
                 </a:solidFill>
@@ -6535,7 +6920,7 @@
     </p:spTree>
     <p:extLst>
       <p:ext uri="{BB962C8B-B14F-4D97-AF65-F5344CB8AC3E}">
-        <p14:creationId xmlns:p14="http://schemas.microsoft.com/office/powerpoint/2010/main" val="2959974630"/>
+        <p14:creationId xmlns:p14="http://schemas.microsoft.com/office/powerpoint/2010/main" xmlns="" val="2959974630"/>
       </p:ext>
     </p:extLst>
   </p:cSld>
@@ -6688,7 +7073,7 @@
           <a:blip r:embed="rId2" cstate="print">
             <a:extLst>
               <a:ext uri="{28A0092B-C50C-407E-A947-70E740481C1C}">
-                <a14:useLocalDpi xmlns:a14="http://schemas.microsoft.com/office/drawing/2010/main" val="0"/>
+                <a14:useLocalDpi xmlns:a14="http://schemas.microsoft.com/office/drawing/2010/main" xmlns="" val="0"/>
               </a:ext>
             </a:extLst>
           </a:blip>
@@ -6708,7 +7093,7 @@
           <a:noFill/>
           <a:extLst>
             <a:ext uri="{909E8E84-426E-40DD-AFC4-6F175D3DCCD1}">
-              <a14:hiddenFill xmlns:a14="http://schemas.microsoft.com/office/drawing/2010/main">
+              <a14:hiddenFill xmlns:a14="http://schemas.microsoft.com/office/drawing/2010/main" xmlns="">
                 <a:solidFill>
                   <a:srgbClr val="FFFFFF"/>
                 </a:solidFill>
@@ -6729,7 +7114,7 @@
           <a:blip r:embed="rId3">
             <a:extLst>
               <a:ext uri="{28A0092B-C50C-407E-A947-70E740481C1C}">
-                <a14:useLocalDpi xmlns:a14="http://schemas.microsoft.com/office/drawing/2010/main" val="0"/>
+                <a14:useLocalDpi xmlns:a14="http://schemas.microsoft.com/office/drawing/2010/main" xmlns="" val="0"/>
               </a:ext>
             </a:extLst>
           </a:blip>
@@ -6749,7 +7134,7 @@
           <a:noFill/>
           <a:extLst>
             <a:ext uri="{909E8E84-426E-40DD-AFC4-6F175D3DCCD1}">
-              <a14:hiddenFill xmlns:a14="http://schemas.microsoft.com/office/drawing/2010/main">
+              <a14:hiddenFill xmlns:a14="http://schemas.microsoft.com/office/drawing/2010/main" xmlns="">
                 <a:solidFill>
                   <a:srgbClr val="FFFFFF"/>
                 </a:solidFill>
@@ -6761,7 +7146,7 @@
     </p:spTree>
     <p:extLst>
       <p:ext uri="{BB962C8B-B14F-4D97-AF65-F5344CB8AC3E}">
-        <p14:creationId xmlns:p14="http://schemas.microsoft.com/office/powerpoint/2010/main" val="2345810140"/>
+        <p14:creationId xmlns:p14="http://schemas.microsoft.com/office/powerpoint/2010/main" xmlns="" val="2345810140"/>
       </p:ext>
     </p:extLst>
   </p:cSld>
@@ -7198,7 +7583,7 @@
           <a:blip r:embed="rId2">
             <a:extLst>
               <a:ext uri="{28A0092B-C50C-407E-A947-70E740481C1C}">
-                <a14:useLocalDpi xmlns:a14="http://schemas.microsoft.com/office/drawing/2010/main" val="0"/>
+                <a14:useLocalDpi xmlns:a14="http://schemas.microsoft.com/office/drawing/2010/main" xmlns="" val="0"/>
               </a:ext>
             </a:extLst>
           </a:blip>
@@ -7218,7 +7603,7 @@
           <a:noFill/>
           <a:extLst>
             <a:ext uri="{909E8E84-426E-40DD-AFC4-6F175D3DCCD1}">
-              <a14:hiddenFill xmlns:a14="http://schemas.microsoft.com/office/drawing/2010/main">
+              <a14:hiddenFill xmlns:a14="http://schemas.microsoft.com/office/drawing/2010/main" xmlns="">
                 <a:solidFill>
                   <a:srgbClr val="FFFFFF"/>
                 </a:solidFill>
@@ -7239,7 +7624,7 @@
           <a:blip r:embed="rId3">
             <a:extLst>
               <a:ext uri="{28A0092B-C50C-407E-A947-70E740481C1C}">
-                <a14:useLocalDpi xmlns:a14="http://schemas.microsoft.com/office/drawing/2010/main" val="0"/>
+                <a14:useLocalDpi xmlns:a14="http://schemas.microsoft.com/office/drawing/2010/main" xmlns="" val="0"/>
               </a:ext>
             </a:extLst>
           </a:blip>
@@ -7259,7 +7644,7 @@
           <a:noFill/>
           <a:extLst>
             <a:ext uri="{909E8E84-426E-40DD-AFC4-6F175D3DCCD1}">
-              <a14:hiddenFill xmlns:a14="http://schemas.microsoft.com/office/drawing/2010/main">
+              <a14:hiddenFill xmlns:a14="http://schemas.microsoft.com/office/drawing/2010/main" xmlns="">
                 <a:solidFill>
                   <a:srgbClr val="FFFFFF"/>
                 </a:solidFill>
@@ -7271,7 +7656,7 @@
     </p:spTree>
     <p:extLst>
       <p:ext uri="{BB962C8B-B14F-4D97-AF65-F5344CB8AC3E}">
-        <p14:creationId xmlns:p14="http://schemas.microsoft.com/office/powerpoint/2010/main" val="3256290392"/>
+        <p14:creationId xmlns:p14="http://schemas.microsoft.com/office/powerpoint/2010/main" xmlns="" val="3256290392"/>
       </p:ext>
     </p:extLst>
   </p:cSld>
@@ -7631,7 +8016,7 @@
           <a:blip r:embed="rId2">
             <a:extLst>
               <a:ext uri="{28A0092B-C50C-407E-A947-70E740481C1C}">
-                <a14:useLocalDpi xmlns:a14="http://schemas.microsoft.com/office/drawing/2010/main" val="0"/>
+                <a14:useLocalDpi xmlns:a14="http://schemas.microsoft.com/office/drawing/2010/main" xmlns="" val="0"/>
               </a:ext>
             </a:extLst>
           </a:blip>
@@ -7660,7 +8045,7 @@
           </a:effectLst>
           <a:extLst>
             <a:ext uri="{909E8E84-426E-40DD-AFC4-6F175D3DCCD1}">
-              <a14:hiddenFill xmlns:a14="http://schemas.microsoft.com/office/drawing/2010/main">
+              <a14:hiddenFill xmlns:a14="http://schemas.microsoft.com/office/drawing/2010/main" xmlns="">
                 <a:solidFill>
                   <a:srgbClr val="FFFFFF"/>
                 </a:solidFill>
@@ -7672,7 +8057,7 @@
     </p:spTree>
     <p:extLst>
       <p:ext uri="{BB962C8B-B14F-4D97-AF65-F5344CB8AC3E}">
-        <p14:creationId xmlns:p14="http://schemas.microsoft.com/office/powerpoint/2010/main" val="2206206476"/>
+        <p14:creationId xmlns:p14="http://schemas.microsoft.com/office/powerpoint/2010/main" xmlns="" val="2206206476"/>
       </p:ext>
     </p:extLst>
   </p:cSld>
@@ -8160,7 +8545,7 @@
           <a:blip r:embed="rId2">
             <a:extLst>
               <a:ext uri="{28A0092B-C50C-407E-A947-70E740481C1C}">
-                <a14:useLocalDpi xmlns:a14="http://schemas.microsoft.com/office/drawing/2010/main" val="0"/>
+                <a14:useLocalDpi xmlns:a14="http://schemas.microsoft.com/office/drawing/2010/main" xmlns="" val="0"/>
               </a:ext>
             </a:extLst>
           </a:blip>
@@ -8183,14 +8568,14 @@
           </a:ln>
           <a:extLst>
             <a:ext uri="{909E8E84-426E-40DD-AFC4-6F175D3DCCD1}">
-              <a14:hiddenFill xmlns:a14="http://schemas.microsoft.com/office/drawing/2010/main">
+              <a14:hiddenFill xmlns:a14="http://schemas.microsoft.com/office/drawing/2010/main" xmlns="">
                 <a:solidFill>
                   <a:schemeClr val="accent1"/>
                 </a:solidFill>
               </a14:hiddenFill>
             </a:ext>
             <a:ext uri="{91240B29-F687-4F45-9708-019B960494DF}">
-              <a14:hiddenLine xmlns:a14="http://schemas.microsoft.com/office/drawing/2010/main" w="9525">
+              <a14:hiddenLine xmlns:a14="http://schemas.microsoft.com/office/drawing/2010/main" xmlns="" w="9525">
                 <a:solidFill>
                   <a:schemeClr val="tx1"/>
                 </a:solidFill>
@@ -8205,7 +8590,7 @@
     </p:spTree>
     <p:extLst>
       <p:ext uri="{BB962C8B-B14F-4D97-AF65-F5344CB8AC3E}">
-        <p14:creationId xmlns:p14="http://schemas.microsoft.com/office/powerpoint/2010/main" val="3530101934"/>
+        <p14:creationId xmlns:p14="http://schemas.microsoft.com/office/powerpoint/2010/main" xmlns="" val="3530101934"/>
       </p:ext>
     </p:extLst>
   </p:cSld>
@@ -8521,7 +8906,7 @@
           <a:blip r:embed="rId2">
             <a:extLst>
               <a:ext uri="{28A0092B-C50C-407E-A947-70E740481C1C}">
-                <a14:useLocalDpi xmlns:a14="http://schemas.microsoft.com/office/drawing/2010/main" val="0"/>
+                <a14:useLocalDpi xmlns:a14="http://schemas.microsoft.com/office/drawing/2010/main" xmlns="" val="0"/>
               </a:ext>
             </a:extLst>
           </a:blip>
@@ -8541,7 +8926,7 @@
           <a:noFill/>
           <a:extLst>
             <a:ext uri="{909E8E84-426E-40DD-AFC4-6F175D3DCCD1}">
-              <a14:hiddenFill xmlns:a14="http://schemas.microsoft.com/office/drawing/2010/main">
+              <a14:hiddenFill xmlns:a14="http://schemas.microsoft.com/office/drawing/2010/main" xmlns="">
                 <a:solidFill>
                   <a:srgbClr val="FFFFFF"/>
                 </a:solidFill>
@@ -8562,7 +8947,7 @@
           <a:blip r:embed="rId3">
             <a:extLst>
               <a:ext uri="{28A0092B-C50C-407E-A947-70E740481C1C}">
-                <a14:useLocalDpi xmlns:a14="http://schemas.microsoft.com/office/drawing/2010/main" val="0"/>
+                <a14:useLocalDpi xmlns:a14="http://schemas.microsoft.com/office/drawing/2010/main" xmlns="" val="0"/>
               </a:ext>
             </a:extLst>
           </a:blip>
@@ -8582,7 +8967,7 @@
           <a:noFill/>
           <a:extLst>
             <a:ext uri="{909E8E84-426E-40DD-AFC4-6F175D3DCCD1}">
-              <a14:hiddenFill xmlns:a14="http://schemas.microsoft.com/office/drawing/2010/main">
+              <a14:hiddenFill xmlns:a14="http://schemas.microsoft.com/office/drawing/2010/main" xmlns="">
                 <a:solidFill>
                   <a:srgbClr val="FFFFFF"/>
                 </a:solidFill>
@@ -8605,7 +8990,7 @@
           <a:blip r:embed="rId4">
             <a:extLst>
               <a:ext uri="{28A0092B-C50C-407E-A947-70E740481C1C}">
-                <a14:useLocalDpi xmlns:a14="http://schemas.microsoft.com/office/drawing/2010/main" val="0"/>
+                <a14:useLocalDpi xmlns:a14="http://schemas.microsoft.com/office/drawing/2010/main" xmlns="" val="0"/>
               </a:ext>
             </a:extLst>
           </a:blip>
@@ -8625,7 +9010,7 @@
           <a:noFill/>
           <a:extLst>
             <a:ext uri="{909E8E84-426E-40DD-AFC4-6F175D3DCCD1}">
-              <a14:hiddenFill xmlns:a14="http://schemas.microsoft.com/office/drawing/2010/main">
+              <a14:hiddenFill xmlns:a14="http://schemas.microsoft.com/office/drawing/2010/main" xmlns="">
                 <a:solidFill>
                   <a:srgbClr val="FFFFFF"/>
                 </a:solidFill>
@@ -8927,7 +9312,7 @@
     </p:spTree>
     <p:extLst>
       <p:ext uri="{BB962C8B-B14F-4D97-AF65-F5344CB8AC3E}">
-        <p14:creationId xmlns:p14="http://schemas.microsoft.com/office/powerpoint/2010/main" val="2412826116"/>
+        <p14:creationId xmlns:p14="http://schemas.microsoft.com/office/powerpoint/2010/main" xmlns="" val="2412826116"/>
       </p:ext>
     </p:extLst>
   </p:cSld>
@@ -8971,15 +9356,22 @@
             <p:ph type="title"/>
           </p:nvPr>
         </p:nvSpPr>
-        <p:spPr/>
-        <p:txBody>
-          <a:bodyPr/>
+        <p:spPr>
+          <a:xfrm>
+            <a:off x="467544" y="836712"/>
+            <a:ext cx="8229600" cy="720080"/>
+          </a:xfrm>
+        </p:spPr>
+        <p:txBody>
+          <a:bodyPr>
+            <a:normAutofit fontScale="90000"/>
+          </a:bodyPr>
           <a:lstStyle/>
           <a:p>
             <a:pPr algn="ctr"/>
             <a:r>
               <a:rPr lang="es-ES" dirty="0" smtClean="0"/>
-              <a:t>Tracer</a:t>
+              <a:t>Profiler</a:t>
             </a:r>
             <a:endParaRPr lang="es-ES" dirty="0"/>
           </a:p>
@@ -8987,17 +9379,19 @@
       </p:sp>
       <p:pic>
         <p:nvPicPr>
-          <p:cNvPr id="6146" name="Picture 2" descr="C:\Users\Saskya\Desktop\XML-icon.png"/>
+          <p:cNvPr id="10242" name="Picture 2"/>
           <p:cNvPicPr>
-            <a:picLocks noChangeAspect="1" noChangeArrowheads="1"/>
+            <a:picLocks noGrp="1" noChangeAspect="1" noChangeArrowheads="1"/>
           </p:cNvPicPr>
-          <p:nvPr/>
+          <p:nvPr>
+            <p:ph idx="1"/>
+          </p:nvPr>
         </p:nvPicPr>
         <p:blipFill>
           <a:blip r:embed="rId2">
             <a:extLst>
               <a:ext uri="{28A0092B-C50C-407E-A947-70E740481C1C}">
-                <a14:useLocalDpi xmlns:a14="http://schemas.microsoft.com/office/drawing/2010/main" val="0"/>
+                <a14:useLocalDpi xmlns:a14="http://schemas.microsoft.com/office/drawing/2010/main" xmlns="" val="0"/>
               </a:ext>
             </a:extLst>
           </a:blip>
@@ -9008,402 +9402,41 @@
         </p:blipFill>
         <p:spPr bwMode="auto">
           <a:xfrm>
-            <a:off x="7596336" y="3350185"/>
-            <a:ext cx="1358280" cy="1358280"/>
+            <a:off x="611560" y="1916832"/>
+            <a:ext cx="8142108" cy="4389437"/>
           </a:xfrm>
           <a:prstGeom prst="rect">
             <a:avLst/>
           </a:prstGeom>
           <a:noFill/>
+          <a:ln>
+            <a:noFill/>
+          </a:ln>
           <a:extLst>
             <a:ext uri="{909E8E84-426E-40DD-AFC4-6F175D3DCCD1}">
-              <a14:hiddenFill xmlns:a14="http://schemas.microsoft.com/office/drawing/2010/main">
+              <a14:hiddenFill xmlns:a14="http://schemas.microsoft.com/office/drawing/2010/main" xmlns="">
                 <a:solidFill>
-                  <a:srgbClr val="FFFFFF"/>
+                  <a:schemeClr val="accent1"/>
                 </a:solidFill>
               </a14:hiddenFill>
+            </a:ext>
+            <a:ext uri="{91240B29-F687-4F45-9708-019B960494DF}">
+              <a14:hiddenLine xmlns:a14="http://schemas.microsoft.com/office/drawing/2010/main" xmlns="" w="9525">
+                <a:solidFill>
+                  <a:schemeClr val="tx1"/>
+                </a:solidFill>
+                <a:miter lim="800000"/>
+                <a:headEnd/>
+                <a:tailEnd/>
+              </a14:hiddenLine>
             </a:ext>
           </a:extLst>
         </p:spPr>
       </p:pic>
-      <p:pic>
-        <p:nvPicPr>
-          <p:cNvPr id="6147" name="Picture 3" descr="C:\Users\Saskya\Desktop\descarga.jpe"/>
-          <p:cNvPicPr>
-            <a:picLocks noChangeAspect="1" noChangeArrowheads="1"/>
-          </p:cNvPicPr>
-          <p:nvPr/>
-        </p:nvPicPr>
-        <p:blipFill>
-          <a:blip r:embed="rId3">
-            <a:extLst>
-              <a:ext uri="{28A0092B-C50C-407E-A947-70E740481C1C}">
-                <a14:useLocalDpi xmlns:a14="http://schemas.microsoft.com/office/drawing/2010/main" val="0"/>
-              </a:ext>
-            </a:extLst>
-          </a:blip>
-          <a:srcRect/>
-          <a:stretch>
-            <a:fillRect/>
-          </a:stretch>
-        </p:blipFill>
-        <p:spPr bwMode="auto">
-          <a:xfrm>
-            <a:off x="619956" y="4491845"/>
-            <a:ext cx="1008112" cy="1008112"/>
-          </a:xfrm>
-          <a:prstGeom prst="rect">
-            <a:avLst/>
-          </a:prstGeom>
-          <a:noFill/>
-          <a:extLst>
-            <a:ext uri="{909E8E84-426E-40DD-AFC4-6F175D3DCCD1}">
-              <a14:hiddenFill xmlns:a14="http://schemas.microsoft.com/office/drawing/2010/main">
-                <a:solidFill>
-                  <a:srgbClr val="FFFFFF"/>
-                </a:solidFill>
-              </a14:hiddenFill>
-            </a:ext>
-          </a:extLst>
-        </p:spPr>
-      </p:pic>
-      <p:pic>
-        <p:nvPicPr>
-          <p:cNvPr id="6148" name="Picture 4" descr="C:\Users\Saskya\Desktop\class_file_java.png"/>
-          <p:cNvPicPr>
-            <a:picLocks noGrp="1" noChangeAspect="1" noChangeArrowheads="1"/>
-          </p:cNvPicPr>
-          <p:nvPr>
-            <p:ph idx="1"/>
-          </p:nvPr>
-        </p:nvPicPr>
-        <p:blipFill>
-          <a:blip r:embed="rId4">
-            <a:extLst>
-              <a:ext uri="{28A0092B-C50C-407E-A947-70E740481C1C}">
-                <a14:useLocalDpi xmlns:a14="http://schemas.microsoft.com/office/drawing/2010/main" val="0"/>
-              </a:ext>
-            </a:extLst>
-          </a:blip>
-          <a:srcRect/>
-          <a:stretch>
-            <a:fillRect/>
-          </a:stretch>
-        </p:blipFill>
-        <p:spPr bwMode="auto">
-          <a:xfrm>
-            <a:off x="485156" y="2435823"/>
-            <a:ext cx="1238042" cy="1238042"/>
-          </a:xfrm>
-          <a:prstGeom prst="rect">
-            <a:avLst/>
-          </a:prstGeom>
-          <a:noFill/>
-          <a:extLst>
-            <a:ext uri="{909E8E84-426E-40DD-AFC4-6F175D3DCCD1}">
-              <a14:hiddenFill xmlns:a14="http://schemas.microsoft.com/office/drawing/2010/main">
-                <a:solidFill>
-                  <a:srgbClr val="FFFFFF"/>
-                </a:solidFill>
-              </a14:hiddenFill>
-            </a:ext>
-          </a:extLst>
-        </p:spPr>
-      </p:pic>
-      <p:sp>
-        <p:nvSpPr>
-          <p:cNvPr id="5" name="4 CuadroTexto"/>
-          <p:cNvSpPr txBox="1"/>
-          <p:nvPr/>
-        </p:nvSpPr>
-        <p:spPr>
-          <a:xfrm>
-            <a:off x="4119942" y="3770821"/>
-            <a:ext cx="1846468" cy="584775"/>
-          </a:xfrm>
-          <a:prstGeom prst="rect">
-            <a:avLst/>
-          </a:prstGeom>
-        </p:spPr>
-        <p:style>
-          <a:lnRef idx="1">
-            <a:schemeClr val="dk1"/>
-          </a:lnRef>
-          <a:fillRef idx="1002">
-            <a:schemeClr val="dk2"/>
-          </a:fillRef>
-          <a:effectRef idx="1">
-            <a:schemeClr val="dk1"/>
-          </a:effectRef>
-          <a:fontRef idx="minor">
-            <a:schemeClr val="dk1"/>
-          </a:fontRef>
-        </p:style>
-        <p:txBody>
-          <a:bodyPr wrap="square" rtlCol="0">
-            <a:spAutoFit/>
-          </a:bodyPr>
-          <a:lstStyle/>
-          <a:p>
-            <a:r>
-              <a:rPr lang="es-ES" sz="2800" dirty="0" smtClean="0"/>
-              <a:t> </a:t>
-            </a:r>
-            <a:r>
-              <a:rPr lang="es-ES" sz="3200" dirty="0" smtClean="0">
-                <a:solidFill>
-                  <a:schemeClr val="bg1"/>
-                </a:solidFill>
-                <a:effectLst>
-                  <a:outerShdw blurRad="38100" dist="38100" dir="2700000" algn="tl">
-                    <a:srgbClr val="000000">
-                      <a:alpha val="43137"/>
-                    </a:srgbClr>
-                  </a:outerShdw>
-                </a:effectLst>
-              </a:rPr>
-              <a:t>TRACER</a:t>
-            </a:r>
-            <a:endParaRPr lang="es-ES" sz="3200" dirty="0">
-              <a:solidFill>
-                <a:schemeClr val="bg1"/>
-              </a:solidFill>
-              <a:effectLst>
-                <a:outerShdw blurRad="38100" dist="38100" dir="2700000" algn="tl">
-                  <a:srgbClr val="000000">
-                    <a:alpha val="43137"/>
-                  </a:srgbClr>
-                </a:outerShdw>
-              </a:effectLst>
-            </a:endParaRPr>
-          </a:p>
-        </p:txBody>
-      </p:sp>
-      <p:sp>
-        <p:nvSpPr>
-          <p:cNvPr id="6" name="5 CuadroTexto"/>
-          <p:cNvSpPr txBox="1"/>
-          <p:nvPr/>
-        </p:nvSpPr>
-        <p:spPr>
-          <a:xfrm>
-            <a:off x="477104" y="3568017"/>
-            <a:ext cx="1804405" cy="430887"/>
-          </a:xfrm>
-          <a:prstGeom prst="rect">
-            <a:avLst/>
-          </a:prstGeom>
-          <a:noFill/>
-        </p:spPr>
-        <p:txBody>
-          <a:bodyPr wrap="none" rtlCol="0">
-            <a:spAutoFit/>
-          </a:bodyPr>
-          <a:lstStyle/>
-          <a:p>
-            <a:r>
-              <a:rPr lang="es-ES" sz="2200" dirty="0" smtClean="0">
-                <a:effectLst>
-                  <a:outerShdw blurRad="38100" dist="38100" dir="2700000" algn="tl">
-                    <a:srgbClr val="000000">
-                      <a:alpha val="43137"/>
-                    </a:srgbClr>
-                  </a:outerShdw>
-                </a:effectLst>
-              </a:rPr>
-              <a:t>Fichero .class</a:t>
-            </a:r>
-            <a:endParaRPr lang="es-ES" sz="2200" dirty="0">
-              <a:effectLst>
-                <a:outerShdw blurRad="38100" dist="38100" dir="2700000" algn="tl">
-                  <a:srgbClr val="000000">
-                    <a:alpha val="43137"/>
-                  </a:srgbClr>
-                </a:outerShdw>
-              </a:effectLst>
-            </a:endParaRPr>
-          </a:p>
-        </p:txBody>
-      </p:sp>
-      <p:sp>
-        <p:nvSpPr>
-          <p:cNvPr id="7" name="6 CuadroTexto"/>
-          <p:cNvSpPr txBox="1"/>
-          <p:nvPr/>
-        </p:nvSpPr>
-        <p:spPr>
-          <a:xfrm>
-            <a:off x="536989" y="5733256"/>
-            <a:ext cx="2954891" cy="430887"/>
-          </a:xfrm>
-          <a:prstGeom prst="rect">
-            <a:avLst/>
-          </a:prstGeom>
-          <a:noFill/>
-        </p:spPr>
-        <p:txBody>
-          <a:bodyPr wrap="square" rtlCol="0">
-            <a:spAutoFit/>
-          </a:bodyPr>
-          <a:lstStyle/>
-          <a:p>
-            <a:r>
-              <a:rPr lang="es-ES" sz="2200" dirty="0" smtClean="0">
-                <a:effectLst>
-                  <a:outerShdw blurRad="38100" dist="38100" dir="2700000" algn="tl">
-                    <a:srgbClr val="000000">
-                      <a:alpha val="43137"/>
-                    </a:srgbClr>
-                  </a:outerShdw>
-                </a:effectLst>
-              </a:rPr>
-              <a:t>Fichero .jar ejecutable</a:t>
-            </a:r>
-            <a:endParaRPr lang="es-ES" sz="2200" dirty="0">
-              <a:effectLst>
-                <a:outerShdw blurRad="38100" dist="38100" dir="2700000" algn="tl">
-                  <a:srgbClr val="000000">
-                    <a:alpha val="43137"/>
-                  </a:srgbClr>
-                </a:outerShdw>
-              </a:effectLst>
-            </a:endParaRPr>
-          </a:p>
-        </p:txBody>
-      </p:sp>
-      <p:sp>
-        <p:nvSpPr>
-          <p:cNvPr id="12" name="11 Flecha derecha"/>
-          <p:cNvSpPr/>
-          <p:nvPr/>
-        </p:nvSpPr>
-        <p:spPr>
-          <a:xfrm>
-            <a:off x="6125294" y="3792277"/>
-            <a:ext cx="1440160" cy="575774"/>
-          </a:xfrm>
-          <a:prstGeom prst="rightArrow">
-            <a:avLst/>
-          </a:prstGeom>
-        </p:spPr>
-        <p:style>
-          <a:lnRef idx="2">
-            <a:schemeClr val="accent1">
-              <a:shade val="50000"/>
-            </a:schemeClr>
-          </a:lnRef>
-          <a:fillRef idx="1">
-            <a:schemeClr val="accent1"/>
-          </a:fillRef>
-          <a:effectRef idx="0">
-            <a:schemeClr val="accent1"/>
-          </a:effectRef>
-          <a:fontRef idx="minor">
-            <a:schemeClr val="lt1"/>
-          </a:fontRef>
-        </p:style>
-        <p:txBody>
-          <a:bodyPr rtlCol="0" anchor="ctr"/>
-          <a:lstStyle/>
-          <a:p>
-            <a:pPr algn="ctr"/>
-            <a:endParaRPr lang="es-ES"/>
-          </a:p>
-        </p:txBody>
-      </p:sp>
-      <p:sp>
-        <p:nvSpPr>
-          <p:cNvPr id="19" name="18 Flecha derecha"/>
-          <p:cNvSpPr/>
-          <p:nvPr/>
-        </p:nvSpPr>
-        <p:spPr>
-          <a:xfrm rot="1448374">
-            <a:off x="1936775" y="3134161"/>
-            <a:ext cx="2035937" cy="432048"/>
-          </a:xfrm>
-          <a:prstGeom prst="rightArrow">
-            <a:avLst>
-              <a:gd name="adj1" fmla="val 50000"/>
-              <a:gd name="adj2" fmla="val 52800"/>
-            </a:avLst>
-          </a:prstGeom>
-        </p:spPr>
-        <p:style>
-          <a:lnRef idx="2">
-            <a:schemeClr val="accent1">
-              <a:shade val="50000"/>
-            </a:schemeClr>
-          </a:lnRef>
-          <a:fillRef idx="1">
-            <a:schemeClr val="accent1"/>
-          </a:fillRef>
-          <a:effectRef idx="0">
-            <a:schemeClr val="accent1"/>
-          </a:effectRef>
-          <a:fontRef idx="minor">
-            <a:schemeClr val="lt1"/>
-          </a:fontRef>
-        </p:style>
-        <p:txBody>
-          <a:bodyPr rtlCol="0" anchor="ctr"/>
-          <a:lstStyle/>
-          <a:p>
-            <a:pPr algn="ctr"/>
-            <a:endParaRPr lang="es-ES"/>
-          </a:p>
-        </p:txBody>
-      </p:sp>
-      <p:sp>
-        <p:nvSpPr>
-          <p:cNvPr id="20" name="19 Flecha derecha"/>
-          <p:cNvSpPr/>
-          <p:nvPr/>
-        </p:nvSpPr>
-        <p:spPr>
-          <a:xfrm rot="20151626" flipV="1">
-            <a:off x="1936774" y="4513444"/>
-            <a:ext cx="2035937" cy="432048"/>
-          </a:xfrm>
-          <a:prstGeom prst="rightArrow">
-            <a:avLst>
-              <a:gd name="adj1" fmla="val 50000"/>
-              <a:gd name="adj2" fmla="val 52800"/>
-            </a:avLst>
-          </a:prstGeom>
-          <a:effectLst>
-            <a:reflection endPos="0" dist="50800" dir="5400000" sy="-100000" algn="bl" rotWithShape="0"/>
-          </a:effectLst>
-        </p:spPr>
-        <p:style>
-          <a:lnRef idx="2">
-            <a:schemeClr val="accent1">
-              <a:shade val="50000"/>
-            </a:schemeClr>
-          </a:lnRef>
-          <a:fillRef idx="1">
-            <a:schemeClr val="accent1"/>
-          </a:fillRef>
-          <a:effectRef idx="0">
-            <a:schemeClr val="accent1"/>
-          </a:effectRef>
-          <a:fontRef idx="minor">
-            <a:schemeClr val="lt1"/>
-          </a:fontRef>
-        </p:style>
-        <p:txBody>
-          <a:bodyPr rtlCol="0" anchor="ctr"/>
-          <a:lstStyle/>
-          <a:p>
-            <a:pPr algn="ctr"/>
-            <a:endParaRPr lang="es-ES"/>
-          </a:p>
-        </p:txBody>
-      </p:sp>
     </p:spTree>
     <p:extLst>
       <p:ext uri="{BB962C8B-B14F-4D97-AF65-F5344CB8AC3E}">
-        <p14:creationId xmlns:p14="http://schemas.microsoft.com/office/powerpoint/2010/main" val="4196290447"/>
+        <p14:creationId xmlns:p14="http://schemas.microsoft.com/office/powerpoint/2010/main" xmlns="" val="3903137001"/>
       </p:ext>
     </p:extLst>
   </p:cSld>
@@ -9449,57 +9482,38 @@
         </p:nvSpPr>
         <p:spPr>
           <a:xfrm>
-            <a:off x="521136" y="980728"/>
-            <a:ext cx="8229600" cy="576064"/>
+            <a:off x="457200" y="704088"/>
+            <a:ext cx="8229600" cy="852704"/>
           </a:xfrm>
         </p:spPr>
         <p:txBody>
-          <a:bodyPr>
-            <a:normAutofit fontScale="90000"/>
-          </a:bodyPr>
-          <a:lstStyle/>
-          <a:p>
-            <a:pPr algn="ctr"/>
-            <a:r>
-              <a:rPr lang="es-ES" dirty="0" smtClean="0"/>
-              <a:t>Inspector</a:t>
-            </a:r>
-            <a:endParaRPr lang="es-ES" dirty="0"/>
-          </a:p>
-        </p:txBody>
-      </p:sp>
-      <p:sp>
-        <p:nvSpPr>
-          <p:cNvPr id="3" name="2 Marcador de contenido"/>
-          <p:cNvSpPr>
-            <a:spLocks noGrp="1"/>
-          </p:cNvSpPr>
-          <p:nvPr>
-            <p:ph idx="1"/>
-          </p:nvPr>
-        </p:nvSpPr>
-        <p:spPr/>
-        <p:txBody>
           <a:bodyPr/>
           <a:lstStyle/>
           <a:p>
-            <a:endParaRPr lang="es-ES" u="sng" dirty="0"/>
+            <a:pPr algn="ctr"/>
+            <a:r>
+              <a:rPr lang="es-ES" dirty="0" smtClean="0"/>
+              <a:t>Profiler - Estadísticas</a:t>
+            </a:r>
+            <a:endParaRPr lang="es-ES" dirty="0"/>
           </a:p>
         </p:txBody>
       </p:sp>
       <p:pic>
         <p:nvPicPr>
-          <p:cNvPr id="7171" name="Picture 3"/>
+          <p:cNvPr id="11266" name="Picture 2"/>
           <p:cNvPicPr>
-            <a:picLocks noChangeAspect="1" noChangeArrowheads="1"/>
+            <a:picLocks noGrp="1" noChangeAspect="1" noChangeArrowheads="1"/>
           </p:cNvPicPr>
-          <p:nvPr/>
+          <p:nvPr>
+            <p:ph idx="1"/>
+          </p:nvPr>
         </p:nvPicPr>
         <p:blipFill>
           <a:blip r:embed="rId2">
             <a:extLst>
               <a:ext uri="{28A0092B-C50C-407E-A947-70E740481C1C}">
-                <a14:useLocalDpi xmlns:a14="http://schemas.microsoft.com/office/drawing/2010/main" val="0"/>
+                <a14:useLocalDpi xmlns:a14="http://schemas.microsoft.com/office/drawing/2010/main" xmlns="" val="0"/>
               </a:ext>
             </a:extLst>
           </a:blip>
@@ -9510,8 +9524,8 @@
         </p:blipFill>
         <p:spPr bwMode="auto">
           <a:xfrm>
-            <a:off x="253792" y="1988840"/>
-            <a:ext cx="8496944" cy="4468408"/>
+            <a:off x="1619672" y="1772816"/>
+            <a:ext cx="5947714" cy="4821520"/>
           </a:xfrm>
           <a:prstGeom prst="rect">
             <a:avLst/>
@@ -9522,14 +9536,14 @@
           </a:ln>
           <a:extLst>
             <a:ext uri="{909E8E84-426E-40DD-AFC4-6F175D3DCCD1}">
-              <a14:hiddenFill xmlns:a14="http://schemas.microsoft.com/office/drawing/2010/main">
+              <a14:hiddenFill xmlns:a14="http://schemas.microsoft.com/office/drawing/2010/main" xmlns="">
                 <a:solidFill>
                   <a:schemeClr val="accent1"/>
                 </a:solidFill>
               </a14:hiddenFill>
             </a:ext>
             <a:ext uri="{91240B29-F687-4F45-9708-019B960494DF}">
-              <a14:hiddenLine xmlns:a14="http://schemas.microsoft.com/office/drawing/2010/main" w="9525">
+              <a14:hiddenLine xmlns:a14="http://schemas.microsoft.com/office/drawing/2010/main" xmlns="" w="9525">
                 <a:solidFill>
                   <a:schemeClr val="tx1"/>
                 </a:solidFill>
@@ -9544,7 +9558,7 @@
     </p:spTree>
     <p:extLst>
       <p:ext uri="{BB962C8B-B14F-4D97-AF65-F5344CB8AC3E}">
-        <p14:creationId xmlns:p14="http://schemas.microsoft.com/office/powerpoint/2010/main" val="13191627"/>
+        <p14:creationId xmlns:p14="http://schemas.microsoft.com/office/powerpoint/2010/main" xmlns="" val="3048006607"/>
       </p:ext>
     </p:extLst>
   </p:cSld>
@@ -9588,7 +9602,12 @@
             <p:ph type="title"/>
           </p:nvPr>
         </p:nvSpPr>
-        <p:spPr/>
+        <p:spPr>
+          <a:xfrm>
+            <a:off x="457200" y="704088"/>
+            <a:ext cx="8229600" cy="996720"/>
+          </a:xfrm>
+        </p:spPr>
         <p:txBody>
           <a:bodyPr/>
           <a:lstStyle/>
@@ -9596,7 +9615,7 @@
             <a:pPr algn="ctr"/>
             <a:r>
               <a:rPr lang="es-ES" dirty="0" smtClean="0"/>
-              <a:t>Inspector - Árbol de llamadas</a:t>
+              <a:t>Profiler – Datos  </a:t>
             </a:r>
             <a:endParaRPr lang="es-ES" dirty="0"/>
           </a:p>
@@ -9604,7 +9623,7 @@
       </p:sp>
       <p:pic>
         <p:nvPicPr>
-          <p:cNvPr id="5" name="Picture 4"/>
+          <p:cNvPr id="7" name="Picture 4" descr="C:\Users\Saskya\Desktop\Sin título2.png"/>
           <p:cNvPicPr>
             <a:picLocks noGrp="1" noChangeAspect="1" noChangeArrowheads="1"/>
           </p:cNvPicPr>
@@ -9616,42 +9635,29 @@
           <a:blip r:embed="rId2">
             <a:extLst>
               <a:ext uri="{28A0092B-C50C-407E-A947-70E740481C1C}">
-                <a14:useLocalDpi xmlns:a14="http://schemas.microsoft.com/office/drawing/2010/main" val="0"/>
+                <a14:useLocalDpi xmlns:a14="http://schemas.microsoft.com/office/drawing/2010/main" xmlns="" val="0"/>
               </a:ext>
             </a:extLst>
           </a:blip>
-          <a:srcRect l="8891" r="4558"/>
+          <a:srcRect b="36106"/>
           <a:stretch/>
         </p:blipFill>
         <p:spPr bwMode="auto">
           <a:xfrm>
-            <a:off x="467544" y="2636912"/>
-            <a:ext cx="7977876" cy="3176542"/>
+            <a:off x="827584" y="1844824"/>
+            <a:ext cx="7539494" cy="4248472"/>
           </a:xfrm>
           <a:prstGeom prst="rect">
             <a:avLst/>
           </a:prstGeom>
           <a:noFill/>
-          <a:ln>
-            <a:noFill/>
-          </a:ln>
           <a:extLst>
             <a:ext uri="{909E8E84-426E-40DD-AFC4-6F175D3DCCD1}">
-              <a14:hiddenFill xmlns:a14="http://schemas.microsoft.com/office/drawing/2010/main">
+              <a14:hiddenFill xmlns:a14="http://schemas.microsoft.com/office/drawing/2010/main" xmlns="">
                 <a:solidFill>
-                  <a:schemeClr val="accent1"/>
+                  <a:srgbClr val="FFFFFF"/>
                 </a:solidFill>
               </a14:hiddenFill>
-            </a:ext>
-            <a:ext uri="{91240B29-F687-4F45-9708-019B960494DF}">
-              <a14:hiddenLine xmlns:a14="http://schemas.microsoft.com/office/drawing/2010/main" w="9525">
-                <a:solidFill>
-                  <a:schemeClr val="tx1"/>
-                </a:solidFill>
-                <a:miter lim="800000"/>
-                <a:headEnd/>
-                <a:tailEnd/>
-              </a14:hiddenLine>
             </a:ext>
           </a:extLst>
         </p:spPr>
@@ -9659,7 +9665,7 @@
     </p:spTree>
     <p:extLst>
       <p:ext uri="{BB962C8B-B14F-4D97-AF65-F5344CB8AC3E}">
-        <p14:creationId xmlns:p14="http://schemas.microsoft.com/office/powerpoint/2010/main" val="967793235"/>
+        <p14:creationId xmlns:p14="http://schemas.microsoft.com/office/powerpoint/2010/main" xmlns="" val="3322359645"/>
       </p:ext>
     </p:extLst>
   </p:cSld>

</xml_diff>